<commit_message>
Update NCTU CPP project 20210429
</commit_message>
<xml_diff>
--- a/C++_and_OOP/NCTU/project1/HW1_609001002/pics.pptx
+++ b/C++_and_OOP/NCTU/project1/HW1_609001002/pics.pptx
@@ -7,6 +7,7 @@
   <p:sldIdLst>
     <p:sldId id="256" r:id="rId2"/>
     <p:sldId id="257" r:id="rId3"/>
+    <p:sldId id="258" r:id="rId4"/>
   </p:sldIdLst>
   <p:sldSz cx="6858000" cy="9906000" type="A4"/>
   <p:notesSz cx="6858000" cy="9144000"/>
@@ -244,7 +245,7 @@
           <a:p>
             <a:fld id="{CFD73A00-8293-3E44-B8FC-1344C5A2E5D4}" type="datetimeFigureOut">
               <a:rPr kumimoji="1" lang="zh-TW" altLang="en-US" smtClean="0"/>
-              <a:t>2021/4/28</a:t>
+              <a:t>2021/4/29</a:t>
             </a:fld>
             <a:endParaRPr kumimoji="1" lang="zh-TW" altLang="en-US"/>
           </a:p>
@@ -414,7 +415,7 @@
           <a:p>
             <a:fld id="{CFD73A00-8293-3E44-B8FC-1344C5A2E5D4}" type="datetimeFigureOut">
               <a:rPr kumimoji="1" lang="zh-TW" altLang="en-US" smtClean="0"/>
-              <a:t>2021/4/28</a:t>
+              <a:t>2021/4/29</a:t>
             </a:fld>
             <a:endParaRPr kumimoji="1" lang="zh-TW" altLang="en-US"/>
           </a:p>
@@ -594,7 +595,7 @@
           <a:p>
             <a:fld id="{CFD73A00-8293-3E44-B8FC-1344C5A2E5D4}" type="datetimeFigureOut">
               <a:rPr kumimoji="1" lang="zh-TW" altLang="en-US" smtClean="0"/>
-              <a:t>2021/4/28</a:t>
+              <a:t>2021/4/29</a:t>
             </a:fld>
             <a:endParaRPr kumimoji="1" lang="zh-TW" altLang="en-US"/>
           </a:p>
@@ -764,7 +765,7 @@
           <a:p>
             <a:fld id="{CFD73A00-8293-3E44-B8FC-1344C5A2E5D4}" type="datetimeFigureOut">
               <a:rPr kumimoji="1" lang="zh-TW" altLang="en-US" smtClean="0"/>
-              <a:t>2021/4/28</a:t>
+              <a:t>2021/4/29</a:t>
             </a:fld>
             <a:endParaRPr kumimoji="1" lang="zh-TW" altLang="en-US"/>
           </a:p>
@@ -1008,7 +1009,7 @@
           <a:p>
             <a:fld id="{CFD73A00-8293-3E44-B8FC-1344C5A2E5D4}" type="datetimeFigureOut">
               <a:rPr kumimoji="1" lang="zh-TW" altLang="en-US" smtClean="0"/>
-              <a:t>2021/4/28</a:t>
+              <a:t>2021/4/29</a:t>
             </a:fld>
             <a:endParaRPr kumimoji="1" lang="zh-TW" altLang="en-US"/>
           </a:p>
@@ -1240,7 +1241,7 @@
           <a:p>
             <a:fld id="{CFD73A00-8293-3E44-B8FC-1344C5A2E5D4}" type="datetimeFigureOut">
               <a:rPr kumimoji="1" lang="zh-TW" altLang="en-US" smtClean="0"/>
-              <a:t>2021/4/28</a:t>
+              <a:t>2021/4/29</a:t>
             </a:fld>
             <a:endParaRPr kumimoji="1" lang="zh-TW" altLang="en-US"/>
           </a:p>
@@ -1607,7 +1608,7 @@
           <a:p>
             <a:fld id="{CFD73A00-8293-3E44-B8FC-1344C5A2E5D4}" type="datetimeFigureOut">
               <a:rPr kumimoji="1" lang="zh-TW" altLang="en-US" smtClean="0"/>
-              <a:t>2021/4/28</a:t>
+              <a:t>2021/4/29</a:t>
             </a:fld>
             <a:endParaRPr kumimoji="1" lang="zh-TW" altLang="en-US"/>
           </a:p>
@@ -1725,7 +1726,7 @@
           <a:p>
             <a:fld id="{CFD73A00-8293-3E44-B8FC-1344C5A2E5D4}" type="datetimeFigureOut">
               <a:rPr kumimoji="1" lang="zh-TW" altLang="en-US" smtClean="0"/>
-              <a:t>2021/4/28</a:t>
+              <a:t>2021/4/29</a:t>
             </a:fld>
             <a:endParaRPr kumimoji="1" lang="zh-TW" altLang="en-US"/>
           </a:p>
@@ -1820,7 +1821,7 @@
           <a:p>
             <a:fld id="{CFD73A00-8293-3E44-B8FC-1344C5A2E5D4}" type="datetimeFigureOut">
               <a:rPr kumimoji="1" lang="zh-TW" altLang="en-US" smtClean="0"/>
-              <a:t>2021/4/28</a:t>
+              <a:t>2021/4/29</a:t>
             </a:fld>
             <a:endParaRPr kumimoji="1" lang="zh-TW" altLang="en-US"/>
           </a:p>
@@ -2097,7 +2098,7 @@
           <a:p>
             <a:fld id="{CFD73A00-8293-3E44-B8FC-1344C5A2E5D4}" type="datetimeFigureOut">
               <a:rPr kumimoji="1" lang="zh-TW" altLang="en-US" smtClean="0"/>
-              <a:t>2021/4/28</a:t>
+              <a:t>2021/4/29</a:t>
             </a:fld>
             <a:endParaRPr kumimoji="1" lang="zh-TW" altLang="en-US"/>
           </a:p>
@@ -2354,7 +2355,7 @@
           <a:p>
             <a:fld id="{CFD73A00-8293-3E44-B8FC-1344C5A2E5D4}" type="datetimeFigureOut">
               <a:rPr kumimoji="1" lang="zh-TW" altLang="en-US" smtClean="0"/>
-              <a:t>2021/4/28</a:t>
+              <a:t>2021/4/29</a:t>
             </a:fld>
             <a:endParaRPr kumimoji="1" lang="zh-TW" altLang="en-US"/>
           </a:p>
@@ -2567,7 +2568,7 @@
           <a:p>
             <a:fld id="{CFD73A00-8293-3E44-B8FC-1344C5A2E5D4}" type="datetimeFigureOut">
               <a:rPr kumimoji="1" lang="zh-TW" altLang="en-US" smtClean="0"/>
-              <a:t>2021/4/28</a:t>
+              <a:t>2021/4/29</a:t>
             </a:fld>
             <a:endParaRPr kumimoji="1" lang="zh-TW" altLang="en-US"/>
           </a:p>
@@ -8027,20 +8028,12 @@
                 <a:buChar char="•"/>
               </a:pPr>
               <a:r>
-                <a:rPr kumimoji="1" lang="en-US" altLang="zh-TW" sz="1000" dirty="0" err="1">
-                  <a:solidFill>
-                    <a:schemeClr val="tx1"/>
-                  </a:solidFill>
-                </a:rPr>
-                <a:t>triggerEvent</a:t>
-              </a:r>
-              <a:r>
                 <a:rPr kumimoji="1" lang="en-US" altLang="zh-TW" sz="1000" dirty="0">
                   <a:solidFill>
                     <a:schemeClr val="tx1"/>
                   </a:solidFill>
                 </a:rPr>
-                <a:t>(Object*) = 0: bool</a:t>
+                <a:t>triggerEvent(Object*) = 0: bool</a:t>
               </a:r>
             </a:p>
             <a:p>
@@ -8356,20 +8349,12 @@
                 <a:buChar char="•"/>
               </a:pPr>
               <a:r>
-                <a:rPr kumimoji="1" lang="en-US" altLang="zh-TW" sz="1000" dirty="0" err="1">
-                  <a:solidFill>
-                    <a:schemeClr val="tx1"/>
-                  </a:solidFill>
-                </a:rPr>
-                <a:t>triggerEvent</a:t>
-              </a:r>
-              <a:r>
                 <a:rPr kumimoji="1" lang="en-US" altLang="zh-TW" sz="1000" dirty="0">
                   <a:solidFill>
                     <a:schemeClr val="tx1"/>
                   </a:solidFill>
                 </a:rPr>
-                <a:t>(Object*): bool</a:t>
+                <a:t>triggerEvent(Object*): bool</a:t>
               </a:r>
             </a:p>
             <a:p>
@@ -8937,20 +8922,12 @@
                 <a:buChar char="•"/>
               </a:pPr>
               <a:r>
-                <a:rPr kumimoji="1" lang="en-US" altLang="zh-TW" sz="1000" dirty="0" err="1">
-                  <a:solidFill>
-                    <a:schemeClr val="tx1"/>
-                  </a:solidFill>
-                </a:rPr>
-                <a:t>triggerEvent</a:t>
-              </a:r>
-              <a:r>
                 <a:rPr kumimoji="1" lang="en-US" altLang="zh-TW" sz="1000" dirty="0">
                   <a:solidFill>
                     <a:schemeClr val="tx1"/>
                   </a:solidFill>
                 </a:rPr>
-                <a:t>(Object*): bool</a:t>
+                <a:t>triggerEvent(Object*): bool</a:t>
               </a:r>
             </a:p>
             <a:p>
@@ -9512,20 +9489,12 @@
                 <a:buChar char="•"/>
               </a:pPr>
               <a:r>
-                <a:rPr kumimoji="1" lang="en-US" altLang="zh-TW" sz="1000" dirty="0" err="1">
-                  <a:solidFill>
-                    <a:schemeClr val="tx1"/>
-                  </a:solidFill>
-                </a:rPr>
-                <a:t>triggerEvent</a:t>
-              </a:r>
-              <a:r>
                 <a:rPr kumimoji="1" lang="en-US" altLang="zh-TW" sz="1000" dirty="0">
                   <a:solidFill>
                     <a:schemeClr val="tx1"/>
                   </a:solidFill>
                 </a:rPr>
-                <a:t>(Object*): bool</a:t>
+                <a:t>triggerEvent(Object*): bool</a:t>
               </a:r>
             </a:p>
             <a:p>
@@ -9835,20 +9804,12 @@
                 <a:buChar char="•"/>
               </a:pPr>
               <a:r>
-                <a:rPr kumimoji="1" lang="en-US" altLang="zh-TW" sz="1000" dirty="0" err="1">
-                  <a:solidFill>
-                    <a:schemeClr val="tx1"/>
-                  </a:solidFill>
-                </a:rPr>
-                <a:t>triggerEvent</a:t>
-              </a:r>
-              <a:r>
                 <a:rPr kumimoji="1" lang="en-US" altLang="zh-TW" sz="1000" dirty="0">
                   <a:solidFill>
                     <a:schemeClr val="tx1"/>
                   </a:solidFill>
                 </a:rPr>
-                <a:t>(Object*): bool</a:t>
+                <a:t>triggerEvent(Object*): bool</a:t>
               </a:r>
             </a:p>
             <a:p>
@@ -10367,12 +10328,12 @@
             <a:p>
               <a:pPr algn="ctr"/>
               <a:r>
-                <a:rPr kumimoji="1" lang="en-US" altLang="zh-TW" sz="1000" b="1" dirty="0" err="1">
-                  <a:solidFill>
-                    <a:schemeClr val="tx1"/>
-                  </a:solidFill>
-                </a:rPr>
-                <a:t>Dungoen</a:t>
+                <a:rPr kumimoji="1" lang="en-US" altLang="zh-TW" sz="1000" b="1" dirty="0">
+                  <a:solidFill>
+                    <a:schemeClr val="tx1"/>
+                  </a:solidFill>
+                </a:rPr>
+                <a:t>Dungeon</a:t>
               </a:r>
               <a:endParaRPr kumimoji="1" lang="zh-TW" altLang="en-US" sz="1000" b="1" dirty="0">
                 <a:solidFill>
@@ -10707,20 +10668,12 @@
                 <a:buChar char="•"/>
               </a:pPr>
               <a:r>
-                <a:rPr kumimoji="1" lang="en-US" altLang="zh-TW" sz="1000" dirty="0" err="1">
-                  <a:solidFill>
-                    <a:schemeClr val="tx1"/>
-                  </a:solidFill>
-                </a:rPr>
-                <a:t>getRandomRoomNumber</a:t>
-              </a:r>
-              <a:r>
                 <a:rPr kumimoji="1" lang="en-US" altLang="zh-TW" sz="1000" dirty="0">
                   <a:solidFill>
                     <a:schemeClr val="tx1"/>
                   </a:solidFill>
                 </a:rPr>
-                <a:t>(): int</a:t>
+                <a:t>getRandomRoomNumber(): int</a:t>
               </a:r>
             </a:p>
             <a:p>
@@ -10729,20 +10682,12 @@
                 <a:buChar char="•"/>
               </a:pPr>
               <a:r>
-                <a:rPr kumimoji="1" lang="en-US" altLang="zh-TW" sz="1000" dirty="0" err="1">
-                  <a:solidFill>
-                    <a:schemeClr val="tx1"/>
-                  </a:solidFill>
-                </a:rPr>
-                <a:t>createPlayer</a:t>
-              </a:r>
-              <a:r>
                 <a:rPr kumimoji="1" lang="en-US" altLang="zh-TW" sz="1000" dirty="0">
                   <a:solidFill>
                     <a:schemeClr val="tx1"/>
                   </a:solidFill>
                 </a:rPr>
-                <a:t>(): void</a:t>
+                <a:t>createPlayer(): void</a:t>
               </a:r>
             </a:p>
             <a:p>
@@ -10751,20 +10696,12 @@
                 <a:buChar char="•"/>
               </a:pPr>
               <a:r>
-                <a:rPr kumimoji="1" lang="en-US" altLang="zh-TW" sz="1000" dirty="0" err="1">
-                  <a:solidFill>
-                    <a:schemeClr val="tx1"/>
-                  </a:solidFill>
-                </a:rPr>
-                <a:t>createMap</a:t>
-              </a:r>
-              <a:r>
                 <a:rPr kumimoji="1" lang="en-US" altLang="zh-TW" sz="1000" dirty="0">
                   <a:solidFill>
                     <a:schemeClr val="tx1"/>
                   </a:solidFill>
                 </a:rPr>
-                <a:t>(): void</a:t>
+                <a:t>createMap(): void</a:t>
               </a:r>
             </a:p>
             <a:p>
@@ -10773,20 +10710,12 @@
                 <a:buChar char="•"/>
               </a:pPr>
               <a:r>
-                <a:rPr kumimoji="1" lang="en-US" altLang="zh-TW" sz="1000" dirty="0" err="1">
-                  <a:solidFill>
-                    <a:schemeClr val="tx1"/>
-                  </a:solidFill>
-                </a:rPr>
-                <a:t>createNPC</a:t>
-              </a:r>
-              <a:r>
                 <a:rPr kumimoji="1" lang="en-US" altLang="zh-TW" sz="1000" dirty="0">
                   <a:solidFill>
                     <a:schemeClr val="tx1"/>
                   </a:solidFill>
                 </a:rPr>
-                <a:t>(): void</a:t>
+                <a:t>createNPC(): void</a:t>
               </a:r>
             </a:p>
             <a:p>
@@ -10795,20 +10724,12 @@
                 <a:buChar char="•"/>
               </a:pPr>
               <a:r>
-                <a:rPr kumimoji="1" lang="en-US" altLang="zh-TW" sz="1000" dirty="0" err="1">
-                  <a:solidFill>
-                    <a:schemeClr val="tx1"/>
-                  </a:solidFill>
-                </a:rPr>
-                <a:t>createMonster</a:t>
-              </a:r>
-              <a:r>
                 <a:rPr kumimoji="1" lang="en-US" altLang="zh-TW" sz="1000" dirty="0">
                   <a:solidFill>
                     <a:schemeClr val="tx1"/>
                   </a:solidFill>
                 </a:rPr>
-                <a:t>(): void</a:t>
+                <a:t>createMonster(): void</a:t>
               </a:r>
             </a:p>
             <a:p>
@@ -10817,20 +10738,12 @@
                 <a:buChar char="•"/>
               </a:pPr>
               <a:r>
-                <a:rPr kumimoji="1" lang="en-US" altLang="zh-TW" sz="1000" dirty="0" err="1">
-                  <a:solidFill>
-                    <a:schemeClr val="tx1"/>
-                  </a:solidFill>
-                </a:rPr>
-                <a:t>createChest</a:t>
-              </a:r>
-              <a:r>
                 <a:rPr kumimoji="1" lang="en-US" altLang="zh-TW" sz="1000" dirty="0">
                   <a:solidFill>
                     <a:schemeClr val="tx1"/>
                   </a:solidFill>
                 </a:rPr>
-                <a:t>(int): void</a:t>
+                <a:t>createChest(int): void</a:t>
               </a:r>
             </a:p>
             <a:p>
@@ -10839,20 +10752,12 @@
                 <a:buChar char="•"/>
               </a:pPr>
               <a:r>
-                <a:rPr kumimoji="1" lang="en-US" altLang="zh-TW" sz="1000" dirty="0" err="1">
-                  <a:solidFill>
-                    <a:schemeClr val="tx1"/>
-                  </a:solidFill>
-                </a:rPr>
-                <a:t>handleMovement</a:t>
-              </a:r>
-              <a:r>
                 <a:rPr kumimoji="1" lang="en-US" altLang="zh-TW" sz="1000" dirty="0">
                   <a:solidFill>
                     <a:schemeClr val="tx1"/>
                   </a:solidFill>
                 </a:rPr>
-                <a:t>(): void</a:t>
+                <a:t>handleMovement(): void</a:t>
               </a:r>
             </a:p>
             <a:p>
@@ -10861,20 +10766,12 @@
                 <a:buChar char="•"/>
               </a:pPr>
               <a:r>
-                <a:rPr kumimoji="1" lang="en-US" altLang="zh-TW" sz="1000" dirty="0" err="1">
-                  <a:solidFill>
-                    <a:schemeClr val="tx1"/>
-                  </a:solidFill>
-                </a:rPr>
-                <a:t>showMap</a:t>
-              </a:r>
-              <a:r>
                 <a:rPr kumimoji="1" lang="en-US" altLang="zh-TW" sz="1000" dirty="0">
                   <a:solidFill>
                     <a:schemeClr val="tx1"/>
                   </a:solidFill>
                 </a:rPr>
-                <a:t>(): void</a:t>
+                <a:t>showMap(): void</a:t>
               </a:r>
             </a:p>
             <a:p>
@@ -10883,20 +10780,12 @@
                 <a:buChar char="•"/>
               </a:pPr>
               <a:r>
-                <a:rPr kumimoji="1" lang="en-US" altLang="zh-TW" sz="1000" dirty="0" err="1">
-                  <a:solidFill>
-                    <a:schemeClr val="tx1"/>
-                  </a:solidFill>
-                </a:rPr>
-                <a:t>startGame</a:t>
-              </a:r>
-              <a:r>
                 <a:rPr kumimoji="1" lang="en-US" altLang="zh-TW" sz="1000" dirty="0">
                   <a:solidFill>
                     <a:schemeClr val="tx1"/>
                   </a:solidFill>
                 </a:rPr>
-                <a:t>(): void</a:t>
+                <a:t>startGame(): void</a:t>
               </a:r>
             </a:p>
             <a:p>
@@ -10905,20 +10794,12 @@
                 <a:buChar char="•"/>
               </a:pPr>
               <a:r>
-                <a:rPr kumimoji="1" lang="en-US" altLang="zh-TW" sz="1000" dirty="0" err="1">
-                  <a:solidFill>
-                    <a:schemeClr val="tx1"/>
-                  </a:solidFill>
-                </a:rPr>
-                <a:t>chooseAction</a:t>
-              </a:r>
-              <a:r>
                 <a:rPr kumimoji="1" lang="en-US" altLang="zh-TW" sz="1000" dirty="0">
                   <a:solidFill>
                     <a:schemeClr val="tx1"/>
                   </a:solidFill>
                 </a:rPr>
-                <a:t>(): void</a:t>
+                <a:t>chooseAction(): void</a:t>
               </a:r>
             </a:p>
             <a:p>
@@ -10927,20 +10808,12 @@
                 <a:buChar char="•"/>
               </a:pPr>
               <a:r>
-                <a:rPr kumimoji="1" lang="en-US" altLang="zh-TW" sz="1000" dirty="0" err="1">
-                  <a:solidFill>
-                    <a:schemeClr val="tx1"/>
-                  </a:solidFill>
-                </a:rPr>
-                <a:t>checkGameLogic</a:t>
-              </a:r>
-              <a:r>
                 <a:rPr kumimoji="1" lang="en-US" altLang="zh-TW" sz="1000" dirty="0">
                   <a:solidFill>
                     <a:schemeClr val="tx1"/>
                   </a:solidFill>
                 </a:rPr>
-                <a:t>(): bool</a:t>
+                <a:t>checkGameLogic(): bool</a:t>
               </a:r>
             </a:p>
             <a:p>
@@ -10949,20 +10822,12 @@
                 <a:buChar char="•"/>
               </a:pPr>
               <a:r>
-                <a:rPr kumimoji="1" lang="en-US" altLang="zh-TW" sz="1000" dirty="0" err="1">
-                  <a:solidFill>
-                    <a:schemeClr val="tx1"/>
-                  </a:solidFill>
-                </a:rPr>
-                <a:t>runDungeon</a:t>
-              </a:r>
-              <a:r>
                 <a:rPr kumimoji="1" lang="en-US" altLang="zh-TW" sz="1000" dirty="0">
                   <a:solidFill>
                     <a:schemeClr val="tx1"/>
                   </a:solidFill>
                 </a:rPr>
-                <a:t>(): void</a:t>
+                <a:t>runDungeon(): void</a:t>
               </a:r>
               <a:endParaRPr kumimoji="1" lang="zh-TW" altLang="en-US" sz="1000" dirty="0">
                 <a:solidFill>
@@ -13893,6 +13758,1953 @@
     <p:extLst>
       <p:ext uri="{BB962C8B-B14F-4D97-AF65-F5344CB8AC3E}">
         <p14:creationId xmlns:p14="http://schemas.microsoft.com/office/powerpoint/2010/main" val="248744765"/>
+      </p:ext>
+    </p:extLst>
+  </p:cSld>
+  <p:clrMapOvr>
+    <a:masterClrMapping/>
+  </p:clrMapOvr>
+</p:sld>
+</file>
+
+<file path=ppt/slides/slide3.xml><?xml version="1.0" encoding="utf-8"?>
+<p:sld xmlns:a="http://schemas.openxmlformats.org/drawingml/2006/main" xmlns:r="http://schemas.openxmlformats.org/officeDocument/2006/relationships" xmlns:p="http://schemas.openxmlformats.org/presentationml/2006/main">
+  <p:cSld>
+    <p:spTree>
+      <p:nvGrpSpPr>
+        <p:cNvPr id="1" name=""/>
+        <p:cNvGrpSpPr/>
+        <p:nvPr/>
+      </p:nvGrpSpPr>
+      <p:grpSpPr>
+        <a:xfrm>
+          <a:off x="0" y="0"/>
+          <a:ext cx="0" cy="0"/>
+          <a:chOff x="0" y="0"/>
+          <a:chExt cx="0" cy="0"/>
+        </a:xfrm>
+      </p:grpSpPr>
+      <p:sp>
+        <p:nvSpPr>
+          <p:cNvPr id="28" name="文字方塊 27">
+            <a:extLst>
+              <a:ext uri="{FF2B5EF4-FFF2-40B4-BE49-F238E27FC236}">
+                <a16:creationId xmlns:a16="http://schemas.microsoft.com/office/drawing/2014/main" id="{31689A1F-625C-7843-912F-43D643E03BA5}"/>
+              </a:ext>
+            </a:extLst>
+          </p:cNvPr>
+          <p:cNvSpPr txBox="1"/>
+          <p:nvPr/>
+        </p:nvSpPr>
+        <p:spPr>
+          <a:xfrm>
+            <a:off x="100161" y="95985"/>
+            <a:ext cx="867329" cy="246221"/>
+          </a:xfrm>
+          <a:prstGeom prst="rect">
+            <a:avLst/>
+          </a:prstGeom>
+          <a:noFill/>
+          <a:ln>
+            <a:noFill/>
+          </a:ln>
+        </p:spPr>
+        <p:txBody>
+          <a:bodyPr wrap="square" rtlCol="0">
+            <a:spAutoFit/>
+          </a:bodyPr>
+          <a:lstStyle/>
+          <a:p>
+            <a:r>
+              <a:rPr kumimoji="1" lang="en-US" altLang="zh-TW" sz="1000" dirty="0">
+                <a:solidFill>
+                  <a:srgbClr val="0432FF"/>
+                </a:solidFill>
+              </a:rPr>
+              <a:t>runDungeon()</a:t>
+            </a:r>
+            <a:endParaRPr kumimoji="1" lang="zh-TW" altLang="en-US" sz="1000" dirty="0">
+              <a:solidFill>
+                <a:srgbClr val="0432FF"/>
+              </a:solidFill>
+            </a:endParaRPr>
+          </a:p>
+        </p:txBody>
+      </p:sp>
+      <p:grpSp>
+        <p:nvGrpSpPr>
+          <p:cNvPr id="65" name="群組 64">
+            <a:extLst>
+              <a:ext uri="{FF2B5EF4-FFF2-40B4-BE49-F238E27FC236}">
+                <a16:creationId xmlns:a16="http://schemas.microsoft.com/office/drawing/2014/main" id="{7AE74283-B752-0A4F-92D1-63AE9FEF74FE}"/>
+              </a:ext>
+            </a:extLst>
+          </p:cNvPr>
+          <p:cNvGrpSpPr/>
+          <p:nvPr/>
+        </p:nvGrpSpPr>
+        <p:grpSpPr>
+          <a:xfrm>
+            <a:off x="215304" y="439417"/>
+            <a:ext cx="1533162" cy="2718170"/>
+            <a:chOff x="89898" y="70750"/>
+            <a:chExt cx="1533162" cy="2718170"/>
+          </a:xfrm>
+        </p:grpSpPr>
+        <p:sp>
+          <p:nvSpPr>
+            <p:cNvPr id="12" name="矩形 11">
+              <a:extLst>
+                <a:ext uri="{FF2B5EF4-FFF2-40B4-BE49-F238E27FC236}">
+                  <a16:creationId xmlns:a16="http://schemas.microsoft.com/office/drawing/2014/main" id="{18D171D8-7D31-3741-AB76-65086C4A0B1C}"/>
+                </a:ext>
+              </a:extLst>
+            </p:cNvPr>
+            <p:cNvSpPr/>
+            <p:nvPr/>
+          </p:nvSpPr>
+          <p:spPr>
+            <a:xfrm>
+              <a:off x="89898" y="70750"/>
+              <a:ext cx="1533162" cy="2718170"/>
+            </a:xfrm>
+            <a:prstGeom prst="rect">
+              <a:avLst/>
+            </a:prstGeom>
+            <a:noFill/>
+            <a:ln w="9525">
+              <a:solidFill>
+                <a:srgbClr val="0432FF"/>
+              </a:solidFill>
+            </a:ln>
+          </p:spPr>
+          <p:style>
+            <a:lnRef idx="2">
+              <a:schemeClr val="accent1">
+                <a:shade val="50000"/>
+              </a:schemeClr>
+            </a:lnRef>
+            <a:fillRef idx="1">
+              <a:schemeClr val="accent1"/>
+            </a:fillRef>
+            <a:effectRef idx="0">
+              <a:schemeClr val="accent1"/>
+            </a:effectRef>
+            <a:fontRef idx="minor">
+              <a:schemeClr val="lt1"/>
+            </a:fontRef>
+          </p:style>
+          <p:txBody>
+            <a:bodyPr rtlCol="0" anchor="ctr"/>
+            <a:lstStyle/>
+            <a:p>
+              <a:pPr algn="ctr"/>
+              <a:endParaRPr kumimoji="1" lang="zh-TW" altLang="en-US" sz="1000"/>
+            </a:p>
+          </p:txBody>
+        </p:sp>
+        <p:sp>
+          <p:nvSpPr>
+            <p:cNvPr id="14" name="文字方塊 13">
+              <a:extLst>
+                <a:ext uri="{FF2B5EF4-FFF2-40B4-BE49-F238E27FC236}">
+                  <a16:creationId xmlns:a16="http://schemas.microsoft.com/office/drawing/2014/main" id="{80FE28ED-AA7A-A64D-8D4C-71FA8C1DA559}"/>
+                </a:ext>
+              </a:extLst>
+            </p:cNvPr>
+            <p:cNvSpPr txBox="1"/>
+            <p:nvPr/>
+          </p:nvSpPr>
+          <p:spPr>
+            <a:xfrm>
+              <a:off x="182632" y="2451796"/>
+              <a:ext cx="1326128" cy="246221"/>
+            </a:xfrm>
+            <a:prstGeom prst="rect">
+              <a:avLst/>
+            </a:prstGeom>
+            <a:noFill/>
+            <a:ln>
+              <a:solidFill>
+                <a:schemeClr val="tx1"/>
+              </a:solidFill>
+            </a:ln>
+          </p:spPr>
+          <p:txBody>
+            <a:bodyPr wrap="square" lIns="90000" rtlCol="0" anchor="ctr" anchorCtr="0">
+              <a:spAutoFit/>
+            </a:bodyPr>
+            <a:lstStyle/>
+            <a:p>
+              <a:r>
+                <a:rPr kumimoji="1" lang="en-US" altLang="zh-TW" sz="1000" dirty="0"/>
+                <a:t>b. Load game, c. Quit</a:t>
+              </a:r>
+              <a:endParaRPr kumimoji="1" lang="zh-TW" altLang="en-US" sz="1000" dirty="0"/>
+            </a:p>
+          </p:txBody>
+        </p:sp>
+        <p:sp>
+          <p:nvSpPr>
+            <p:cNvPr id="21" name="文字方塊 20">
+              <a:extLst>
+                <a:ext uri="{FF2B5EF4-FFF2-40B4-BE49-F238E27FC236}">
+                  <a16:creationId xmlns:a16="http://schemas.microsoft.com/office/drawing/2014/main" id="{0173F3C4-5E23-7041-A39B-8F343711F41D}"/>
+                </a:ext>
+              </a:extLst>
+            </p:cNvPr>
+            <p:cNvSpPr txBox="1"/>
+            <p:nvPr/>
+          </p:nvSpPr>
+          <p:spPr>
+            <a:xfrm>
+              <a:off x="89899" y="70750"/>
+              <a:ext cx="811441" cy="246221"/>
+            </a:xfrm>
+            <a:prstGeom prst="rect">
+              <a:avLst/>
+            </a:prstGeom>
+            <a:noFill/>
+          </p:spPr>
+          <p:txBody>
+            <a:bodyPr wrap="none" rtlCol="0">
+              <a:spAutoFit/>
+            </a:bodyPr>
+            <a:lstStyle/>
+            <a:p>
+              <a:r>
+                <a:rPr kumimoji="1" lang="en-US" altLang="zh-TW" sz="1000" dirty="0">
+                  <a:solidFill>
+                    <a:srgbClr val="0432FF"/>
+                  </a:solidFill>
+                </a:rPr>
+                <a:t>startGame()</a:t>
+              </a:r>
+              <a:endParaRPr kumimoji="1" lang="zh-TW" altLang="en-US" sz="1000" dirty="0"/>
+            </a:p>
+          </p:txBody>
+        </p:sp>
+        <p:sp>
+          <p:nvSpPr>
+            <p:cNvPr id="22" name="文字方塊 21">
+              <a:extLst>
+                <a:ext uri="{FF2B5EF4-FFF2-40B4-BE49-F238E27FC236}">
+                  <a16:creationId xmlns:a16="http://schemas.microsoft.com/office/drawing/2014/main" id="{96143AC4-F376-FB41-8EAE-97AD93A5854F}"/>
+                </a:ext>
+              </a:extLst>
+            </p:cNvPr>
+            <p:cNvSpPr txBox="1"/>
+            <p:nvPr/>
+          </p:nvSpPr>
+          <p:spPr>
+            <a:xfrm>
+              <a:off x="263466" y="559860"/>
+              <a:ext cx="830677" cy="246221"/>
+            </a:xfrm>
+            <a:prstGeom prst="rect">
+              <a:avLst/>
+            </a:prstGeom>
+            <a:noFill/>
+          </p:spPr>
+          <p:txBody>
+            <a:bodyPr wrap="none" rtlCol="0">
+              <a:spAutoFit/>
+            </a:bodyPr>
+            <a:lstStyle/>
+            <a:p>
+              <a:r>
+                <a:rPr kumimoji="1" lang="en-US" altLang="zh-TW" sz="1000" dirty="0">
+                  <a:solidFill>
+                    <a:srgbClr val="0432FF"/>
+                  </a:solidFill>
+                </a:rPr>
+                <a:t>createMap()</a:t>
+              </a:r>
+              <a:endParaRPr kumimoji="1" lang="zh-TW" altLang="en-US" sz="1000" dirty="0"/>
+            </a:p>
+          </p:txBody>
+        </p:sp>
+        <p:sp>
+          <p:nvSpPr>
+            <p:cNvPr id="23" name="文字方塊 22">
+              <a:extLst>
+                <a:ext uri="{FF2B5EF4-FFF2-40B4-BE49-F238E27FC236}">
+                  <a16:creationId xmlns:a16="http://schemas.microsoft.com/office/drawing/2014/main" id="{288E7253-5D30-CA46-89FD-39CFBB1860A9}"/>
+                </a:ext>
+              </a:extLst>
+            </p:cNvPr>
+            <p:cNvSpPr txBox="1"/>
+            <p:nvPr/>
+          </p:nvSpPr>
+          <p:spPr>
+            <a:xfrm>
+              <a:off x="263466" y="1972686"/>
+              <a:ext cx="1140988" cy="246221"/>
+            </a:xfrm>
+            <a:prstGeom prst="rect">
+              <a:avLst/>
+            </a:prstGeom>
+            <a:noFill/>
+            <a:ln>
+              <a:solidFill>
+                <a:srgbClr val="0432FF"/>
+              </a:solidFill>
+            </a:ln>
+          </p:spPr>
+          <p:txBody>
+            <a:bodyPr wrap="square" rtlCol="0">
+              <a:spAutoFit/>
+            </a:bodyPr>
+            <a:lstStyle/>
+            <a:p>
+              <a:r>
+                <a:rPr kumimoji="1" lang="en-US" altLang="zh-TW" sz="1000" dirty="0">
+                  <a:solidFill>
+                    <a:srgbClr val="0432FF"/>
+                  </a:solidFill>
+                </a:rPr>
+                <a:t>createPlayer()</a:t>
+              </a:r>
+              <a:endParaRPr kumimoji="1" lang="zh-TW" altLang="en-US" sz="1000" dirty="0"/>
+            </a:p>
+          </p:txBody>
+        </p:sp>
+        <p:sp>
+          <p:nvSpPr>
+            <p:cNvPr id="25" name="文字方塊 24">
+              <a:extLst>
+                <a:ext uri="{FF2B5EF4-FFF2-40B4-BE49-F238E27FC236}">
+                  <a16:creationId xmlns:a16="http://schemas.microsoft.com/office/drawing/2014/main" id="{357B0DC5-E090-DE4F-8404-B80115944364}"/>
+                </a:ext>
+              </a:extLst>
+            </p:cNvPr>
+            <p:cNvSpPr txBox="1"/>
+            <p:nvPr/>
+          </p:nvSpPr>
+          <p:spPr>
+            <a:xfrm>
+              <a:off x="182632" y="303044"/>
+              <a:ext cx="896399" cy="246221"/>
+            </a:xfrm>
+            <a:prstGeom prst="rect">
+              <a:avLst/>
+            </a:prstGeom>
+            <a:noFill/>
+          </p:spPr>
+          <p:txBody>
+            <a:bodyPr wrap="none" rtlCol="0">
+              <a:spAutoFit/>
+            </a:bodyPr>
+            <a:lstStyle/>
+            <a:p>
+              <a:r>
+                <a:rPr kumimoji="1" lang="en-US" altLang="zh-TW" sz="1000" dirty="0"/>
+                <a:t>a. New game:</a:t>
+              </a:r>
+              <a:endParaRPr kumimoji="1" lang="zh-TW" altLang="en-US" sz="1000" dirty="0"/>
+            </a:p>
+          </p:txBody>
+        </p:sp>
+        <p:sp>
+          <p:nvSpPr>
+            <p:cNvPr id="26" name="矩形 25">
+              <a:extLst>
+                <a:ext uri="{FF2B5EF4-FFF2-40B4-BE49-F238E27FC236}">
+                  <a16:creationId xmlns:a16="http://schemas.microsoft.com/office/drawing/2014/main" id="{2071C1BA-8C71-9E47-8108-D7737BDF0AEF}"/>
+                </a:ext>
+              </a:extLst>
+            </p:cNvPr>
+            <p:cNvSpPr/>
+            <p:nvPr/>
+          </p:nvSpPr>
+          <p:spPr>
+            <a:xfrm>
+              <a:off x="182632" y="316970"/>
+              <a:ext cx="1326128" cy="2070171"/>
+            </a:xfrm>
+            <a:prstGeom prst="rect">
+              <a:avLst/>
+            </a:prstGeom>
+            <a:noFill/>
+            <a:ln w="9525">
+              <a:solidFill>
+                <a:schemeClr val="tx1"/>
+              </a:solidFill>
+            </a:ln>
+          </p:spPr>
+          <p:style>
+            <a:lnRef idx="2">
+              <a:schemeClr val="accent1">
+                <a:shade val="50000"/>
+              </a:schemeClr>
+            </a:lnRef>
+            <a:fillRef idx="1">
+              <a:schemeClr val="accent1"/>
+            </a:fillRef>
+            <a:effectRef idx="0">
+              <a:schemeClr val="accent1"/>
+            </a:effectRef>
+            <a:fontRef idx="minor">
+              <a:schemeClr val="lt1"/>
+            </a:fontRef>
+          </p:style>
+          <p:txBody>
+            <a:bodyPr rtlCol="0" anchor="ctr"/>
+            <a:lstStyle/>
+            <a:p>
+              <a:pPr algn="ctr"/>
+              <a:endParaRPr kumimoji="1" lang="zh-TW" altLang="en-US" sz="1000" dirty="0">
+                <a:highlight>
+                  <a:srgbClr val="000000"/>
+                </a:highlight>
+              </a:endParaRPr>
+            </a:p>
+          </p:txBody>
+        </p:sp>
+        <p:sp>
+          <p:nvSpPr>
+            <p:cNvPr id="27" name="矩形 26">
+              <a:extLst>
+                <a:ext uri="{FF2B5EF4-FFF2-40B4-BE49-F238E27FC236}">
+                  <a16:creationId xmlns:a16="http://schemas.microsoft.com/office/drawing/2014/main" id="{163AE8F2-34C4-FE4A-B325-947EAF08CD33}"/>
+                </a:ext>
+              </a:extLst>
+            </p:cNvPr>
+            <p:cNvSpPr/>
+            <p:nvPr/>
+          </p:nvSpPr>
+          <p:spPr>
+            <a:xfrm>
+              <a:off x="263468" y="559860"/>
+              <a:ext cx="1140988" cy="1149262"/>
+            </a:xfrm>
+            <a:prstGeom prst="rect">
+              <a:avLst/>
+            </a:prstGeom>
+            <a:noFill/>
+            <a:ln w="9525">
+              <a:solidFill>
+                <a:srgbClr val="0432FF"/>
+              </a:solidFill>
+            </a:ln>
+          </p:spPr>
+          <p:style>
+            <a:lnRef idx="2">
+              <a:schemeClr val="accent1">
+                <a:shade val="50000"/>
+              </a:schemeClr>
+            </a:lnRef>
+            <a:fillRef idx="1">
+              <a:schemeClr val="accent1"/>
+            </a:fillRef>
+            <a:effectRef idx="0">
+              <a:schemeClr val="accent1"/>
+            </a:effectRef>
+            <a:fontRef idx="minor">
+              <a:schemeClr val="lt1"/>
+            </a:fontRef>
+          </p:style>
+          <p:txBody>
+            <a:bodyPr rtlCol="0" anchor="ctr"/>
+            <a:lstStyle/>
+            <a:p>
+              <a:pPr algn="ctr"/>
+              <a:endParaRPr kumimoji="1" lang="zh-TW" altLang="en-US" sz="1000" dirty="0">
+                <a:highlight>
+                  <a:srgbClr val="000000"/>
+                </a:highlight>
+              </a:endParaRPr>
+            </a:p>
+          </p:txBody>
+        </p:sp>
+        <p:sp>
+          <p:nvSpPr>
+            <p:cNvPr id="29" name="文字方塊 28">
+              <a:extLst>
+                <a:ext uri="{FF2B5EF4-FFF2-40B4-BE49-F238E27FC236}">
+                  <a16:creationId xmlns:a16="http://schemas.microsoft.com/office/drawing/2014/main" id="{CB81A161-8B97-D547-B662-006A36A75F28}"/>
+                </a:ext>
+              </a:extLst>
+            </p:cNvPr>
+            <p:cNvSpPr txBox="1"/>
+            <p:nvPr/>
+          </p:nvSpPr>
+          <p:spPr>
+            <a:xfrm>
+              <a:off x="311973" y="811069"/>
+              <a:ext cx="1021110" cy="246221"/>
+            </a:xfrm>
+            <a:prstGeom prst="rect">
+              <a:avLst/>
+            </a:prstGeom>
+            <a:noFill/>
+            <a:ln>
+              <a:solidFill>
+                <a:srgbClr val="0432FF"/>
+              </a:solidFill>
+            </a:ln>
+          </p:spPr>
+          <p:txBody>
+            <a:bodyPr wrap="square" rtlCol="0">
+              <a:spAutoFit/>
+            </a:bodyPr>
+            <a:lstStyle/>
+            <a:p>
+              <a:r>
+                <a:rPr kumimoji="1" lang="en-US" altLang="zh-TW" sz="1000" dirty="0">
+                  <a:solidFill>
+                    <a:srgbClr val="0432FF"/>
+                  </a:solidFill>
+                </a:rPr>
+                <a:t>createNPC()</a:t>
+              </a:r>
+              <a:endParaRPr kumimoji="1" lang="zh-TW" altLang="en-US" sz="1000" dirty="0">
+                <a:solidFill>
+                  <a:srgbClr val="0432FF"/>
+                </a:solidFill>
+              </a:endParaRPr>
+            </a:p>
+          </p:txBody>
+        </p:sp>
+        <p:sp>
+          <p:nvSpPr>
+            <p:cNvPr id="30" name="文字方塊 29">
+              <a:extLst>
+                <a:ext uri="{FF2B5EF4-FFF2-40B4-BE49-F238E27FC236}">
+                  <a16:creationId xmlns:a16="http://schemas.microsoft.com/office/drawing/2014/main" id="{2CDB449F-CB13-3D45-82BE-0C742B4E14B0}"/>
+                </a:ext>
+              </a:extLst>
+            </p:cNvPr>
+            <p:cNvSpPr txBox="1"/>
+            <p:nvPr/>
+          </p:nvSpPr>
+          <p:spPr>
+            <a:xfrm>
+              <a:off x="311973" y="1108028"/>
+              <a:ext cx="1021110" cy="246221"/>
+            </a:xfrm>
+            <a:prstGeom prst="rect">
+              <a:avLst/>
+            </a:prstGeom>
+            <a:noFill/>
+            <a:ln>
+              <a:solidFill>
+                <a:srgbClr val="0432FF"/>
+              </a:solidFill>
+            </a:ln>
+          </p:spPr>
+          <p:txBody>
+            <a:bodyPr wrap="square" rtlCol="0">
+              <a:spAutoFit/>
+            </a:bodyPr>
+            <a:lstStyle/>
+            <a:p>
+              <a:r>
+                <a:rPr kumimoji="1" lang="en-US" altLang="zh-TW" sz="1000" dirty="0">
+                  <a:solidFill>
+                    <a:srgbClr val="0432FF"/>
+                  </a:solidFill>
+                </a:rPr>
+                <a:t>createMonster()</a:t>
+              </a:r>
+              <a:endParaRPr kumimoji="1" lang="zh-TW" altLang="en-US" sz="1000" dirty="0">
+                <a:solidFill>
+                  <a:srgbClr val="0432FF"/>
+                </a:solidFill>
+              </a:endParaRPr>
+            </a:p>
+          </p:txBody>
+        </p:sp>
+        <p:sp>
+          <p:nvSpPr>
+            <p:cNvPr id="31" name="文字方塊 30">
+              <a:extLst>
+                <a:ext uri="{FF2B5EF4-FFF2-40B4-BE49-F238E27FC236}">
+                  <a16:creationId xmlns:a16="http://schemas.microsoft.com/office/drawing/2014/main" id="{0DDCE1FE-1FA4-9F4C-AEE6-BE489FAE4CBC}"/>
+                </a:ext>
+              </a:extLst>
+            </p:cNvPr>
+            <p:cNvSpPr txBox="1"/>
+            <p:nvPr/>
+          </p:nvSpPr>
+          <p:spPr>
+            <a:xfrm>
+              <a:off x="311973" y="1404988"/>
+              <a:ext cx="1021110" cy="246221"/>
+            </a:xfrm>
+            <a:prstGeom prst="rect">
+              <a:avLst/>
+            </a:prstGeom>
+            <a:noFill/>
+            <a:ln>
+              <a:solidFill>
+                <a:srgbClr val="0432FF"/>
+              </a:solidFill>
+            </a:ln>
+          </p:spPr>
+          <p:txBody>
+            <a:bodyPr wrap="square" rtlCol="0">
+              <a:spAutoFit/>
+            </a:bodyPr>
+            <a:lstStyle/>
+            <a:p>
+              <a:r>
+                <a:rPr kumimoji="1" lang="en-US" altLang="zh-TW" sz="1000" dirty="0">
+                  <a:solidFill>
+                    <a:srgbClr val="0432FF"/>
+                  </a:solidFill>
+                </a:rPr>
+                <a:t>createChest()</a:t>
+              </a:r>
+              <a:endParaRPr kumimoji="1" lang="zh-TW" altLang="en-US" sz="1000" dirty="0">
+                <a:solidFill>
+                  <a:srgbClr val="0432FF"/>
+                </a:solidFill>
+              </a:endParaRPr>
+            </a:p>
+          </p:txBody>
+        </p:sp>
+        <p:cxnSp>
+          <p:nvCxnSpPr>
+            <p:cNvPr id="35" name="直線箭頭接點 34">
+              <a:extLst>
+                <a:ext uri="{FF2B5EF4-FFF2-40B4-BE49-F238E27FC236}">
+                  <a16:creationId xmlns:a16="http://schemas.microsoft.com/office/drawing/2014/main" id="{1C2D7C66-870F-1343-9100-7FFBCCCD6363}"/>
+                </a:ext>
+              </a:extLst>
+            </p:cNvPr>
+            <p:cNvCxnSpPr>
+              <a:cxnSpLocks/>
+            </p:cNvCxnSpPr>
+            <p:nvPr/>
+          </p:nvCxnSpPr>
+          <p:spPr>
+            <a:xfrm rot="5400000">
+              <a:off x="699176" y="1840904"/>
+              <a:ext cx="263564" cy="0"/>
+            </a:xfrm>
+            <a:prstGeom prst="straightConnector1">
+              <a:avLst/>
+            </a:prstGeom>
+            <a:ln w="12700">
+              <a:solidFill>
+                <a:schemeClr val="tx1"/>
+              </a:solidFill>
+              <a:tailEnd type="triangle"/>
+            </a:ln>
+          </p:spPr>
+          <p:style>
+            <a:lnRef idx="1">
+              <a:schemeClr val="accent1"/>
+            </a:lnRef>
+            <a:fillRef idx="0">
+              <a:schemeClr val="accent1"/>
+            </a:fillRef>
+            <a:effectRef idx="0">
+              <a:schemeClr val="accent1"/>
+            </a:effectRef>
+            <a:fontRef idx="minor">
+              <a:schemeClr val="tx1"/>
+            </a:fontRef>
+          </p:style>
+        </p:cxnSp>
+      </p:grpSp>
+      <p:grpSp>
+        <p:nvGrpSpPr>
+          <p:cNvPr id="63" name="群組 62">
+            <a:extLst>
+              <a:ext uri="{FF2B5EF4-FFF2-40B4-BE49-F238E27FC236}">
+                <a16:creationId xmlns:a16="http://schemas.microsoft.com/office/drawing/2014/main" id="{72259946-0FB2-304C-94DE-27C9F8C41106}"/>
+              </a:ext>
+            </a:extLst>
+          </p:cNvPr>
+          <p:cNvGrpSpPr/>
+          <p:nvPr/>
+        </p:nvGrpSpPr>
+        <p:grpSpPr>
+          <a:xfrm>
+            <a:off x="2231732" y="204490"/>
+            <a:ext cx="2103663" cy="2953097"/>
+            <a:chOff x="2079717" y="56823"/>
+            <a:chExt cx="2103663" cy="2953097"/>
+          </a:xfrm>
+        </p:grpSpPr>
+        <p:sp>
+          <p:nvSpPr>
+            <p:cNvPr id="8" name="文字方塊 7">
+              <a:extLst>
+                <a:ext uri="{FF2B5EF4-FFF2-40B4-BE49-F238E27FC236}">
+                  <a16:creationId xmlns:a16="http://schemas.microsoft.com/office/drawing/2014/main" id="{AD79C527-ECFB-864F-889E-7C464F99DF8B}"/>
+                </a:ext>
+              </a:extLst>
+            </p:cNvPr>
+            <p:cNvSpPr txBox="1"/>
+            <p:nvPr/>
+          </p:nvSpPr>
+          <p:spPr>
+            <a:xfrm>
+              <a:off x="2079717" y="56823"/>
+              <a:ext cx="966931" cy="246221"/>
+            </a:xfrm>
+            <a:prstGeom prst="rect">
+              <a:avLst/>
+            </a:prstGeom>
+            <a:noFill/>
+          </p:spPr>
+          <p:txBody>
+            <a:bodyPr wrap="none" rtlCol="0">
+              <a:spAutoFit/>
+            </a:bodyPr>
+            <a:lstStyle/>
+            <a:p>
+              <a:r>
+                <a:rPr kumimoji="1" lang="en-US" altLang="zh-TW" sz="1000" dirty="0">
+                  <a:solidFill>
+                    <a:srgbClr val="0432FF"/>
+                  </a:solidFill>
+                </a:rPr>
+                <a:t>chooseAction()</a:t>
+              </a:r>
+              <a:endParaRPr kumimoji="1" lang="zh-TW" altLang="en-US" sz="1000" dirty="0">
+                <a:solidFill>
+                  <a:srgbClr val="0432FF"/>
+                </a:solidFill>
+              </a:endParaRPr>
+            </a:p>
+          </p:txBody>
+        </p:sp>
+        <p:sp>
+          <p:nvSpPr>
+            <p:cNvPr id="40" name="矩形 39">
+              <a:extLst>
+                <a:ext uri="{FF2B5EF4-FFF2-40B4-BE49-F238E27FC236}">
+                  <a16:creationId xmlns:a16="http://schemas.microsoft.com/office/drawing/2014/main" id="{25A2E530-7EF7-5143-BE9C-020BD8864E8B}"/>
+                </a:ext>
+              </a:extLst>
+            </p:cNvPr>
+            <p:cNvSpPr/>
+            <p:nvPr/>
+          </p:nvSpPr>
+          <p:spPr>
+            <a:xfrm>
+              <a:off x="2079717" y="70749"/>
+              <a:ext cx="2103663" cy="2939171"/>
+            </a:xfrm>
+            <a:prstGeom prst="rect">
+              <a:avLst/>
+            </a:prstGeom>
+            <a:noFill/>
+            <a:ln w="9525">
+              <a:solidFill>
+                <a:srgbClr val="0432FF"/>
+              </a:solidFill>
+            </a:ln>
+          </p:spPr>
+          <p:style>
+            <a:lnRef idx="2">
+              <a:schemeClr val="accent1">
+                <a:shade val="50000"/>
+              </a:schemeClr>
+            </a:lnRef>
+            <a:fillRef idx="1">
+              <a:schemeClr val="accent1"/>
+            </a:fillRef>
+            <a:effectRef idx="0">
+              <a:schemeClr val="accent1"/>
+            </a:effectRef>
+            <a:fontRef idx="minor">
+              <a:schemeClr val="lt1"/>
+            </a:fontRef>
+          </p:style>
+          <p:txBody>
+            <a:bodyPr rtlCol="0" anchor="ctr"/>
+            <a:lstStyle/>
+            <a:p>
+              <a:pPr algn="ctr"/>
+              <a:endParaRPr kumimoji="1" lang="zh-TW" altLang="en-US" sz="1000"/>
+            </a:p>
+          </p:txBody>
+        </p:sp>
+        <p:sp>
+          <p:nvSpPr>
+            <p:cNvPr id="41" name="文字方塊 40">
+              <a:extLst>
+                <a:ext uri="{FF2B5EF4-FFF2-40B4-BE49-F238E27FC236}">
+                  <a16:creationId xmlns:a16="http://schemas.microsoft.com/office/drawing/2014/main" id="{2294C28B-D7D9-2F4E-B079-592B932D1331}"/>
+                </a:ext>
+              </a:extLst>
+            </p:cNvPr>
+            <p:cNvSpPr txBox="1"/>
+            <p:nvPr/>
+          </p:nvSpPr>
+          <p:spPr>
+            <a:xfrm>
+              <a:off x="2205984" y="364938"/>
+              <a:ext cx="1880643" cy="246221"/>
+            </a:xfrm>
+            <a:prstGeom prst="rect">
+              <a:avLst/>
+            </a:prstGeom>
+            <a:noFill/>
+          </p:spPr>
+          <p:txBody>
+            <a:bodyPr wrap="none" rtlCol="0">
+              <a:spAutoFit/>
+            </a:bodyPr>
+            <a:lstStyle/>
+            <a:p>
+              <a:r>
+                <a:rPr kumimoji="1" lang="en-US" altLang="zh-TW" sz="1000" dirty="0"/>
+                <a:t>a. Room has object: triggerEvent</a:t>
+              </a:r>
+              <a:endParaRPr kumimoji="1" lang="zh-TW" altLang="en-US" sz="1000" dirty="0"/>
+            </a:p>
+          </p:txBody>
+        </p:sp>
+        <p:sp>
+          <p:nvSpPr>
+            <p:cNvPr id="42" name="矩形 41">
+              <a:extLst>
+                <a:ext uri="{FF2B5EF4-FFF2-40B4-BE49-F238E27FC236}">
+                  <a16:creationId xmlns:a16="http://schemas.microsoft.com/office/drawing/2014/main" id="{D6DD0994-F015-D243-8A56-AF138DCCF147}"/>
+                </a:ext>
+              </a:extLst>
+            </p:cNvPr>
+            <p:cNvSpPr/>
+            <p:nvPr/>
+          </p:nvSpPr>
+          <p:spPr>
+            <a:xfrm>
+              <a:off x="2145751" y="316971"/>
+              <a:ext cx="1940876" cy="1118531"/>
+            </a:xfrm>
+            <a:prstGeom prst="rect">
+              <a:avLst/>
+            </a:prstGeom>
+            <a:noFill/>
+            <a:ln w="9525">
+              <a:solidFill>
+                <a:schemeClr val="tx1"/>
+              </a:solidFill>
+              <a:prstDash val="dash"/>
+            </a:ln>
+          </p:spPr>
+          <p:style>
+            <a:lnRef idx="2">
+              <a:schemeClr val="accent1">
+                <a:shade val="50000"/>
+              </a:schemeClr>
+            </a:lnRef>
+            <a:fillRef idx="1">
+              <a:schemeClr val="accent1"/>
+            </a:fillRef>
+            <a:effectRef idx="0">
+              <a:schemeClr val="accent1"/>
+            </a:effectRef>
+            <a:fontRef idx="minor">
+              <a:schemeClr val="lt1"/>
+            </a:fontRef>
+          </p:style>
+          <p:txBody>
+            <a:bodyPr rtlCol="0" anchor="ctr"/>
+            <a:lstStyle/>
+            <a:p>
+              <a:pPr algn="ctr"/>
+              <a:endParaRPr kumimoji="1" lang="zh-TW" altLang="en-US" sz="1000" dirty="0">
+                <a:highlight>
+                  <a:srgbClr val="000000"/>
+                </a:highlight>
+              </a:endParaRPr>
+            </a:p>
+          </p:txBody>
+        </p:sp>
+        <p:sp>
+          <p:nvSpPr>
+            <p:cNvPr id="43" name="矩形 42">
+              <a:extLst>
+                <a:ext uri="{FF2B5EF4-FFF2-40B4-BE49-F238E27FC236}">
+                  <a16:creationId xmlns:a16="http://schemas.microsoft.com/office/drawing/2014/main" id="{E949E04B-C15C-B148-84FE-CC27D5B4EDF9}"/>
+                </a:ext>
+              </a:extLst>
+            </p:cNvPr>
+            <p:cNvSpPr/>
+            <p:nvPr/>
+          </p:nvSpPr>
+          <p:spPr>
+            <a:xfrm>
+              <a:off x="2234034" y="398268"/>
+              <a:ext cx="1798071" cy="791013"/>
+            </a:xfrm>
+            <a:prstGeom prst="rect">
+              <a:avLst/>
+            </a:prstGeom>
+            <a:noFill/>
+            <a:ln w="9525">
+              <a:solidFill>
+                <a:schemeClr val="tx1"/>
+              </a:solidFill>
+            </a:ln>
+          </p:spPr>
+          <p:style>
+            <a:lnRef idx="2">
+              <a:schemeClr val="accent1">
+                <a:shade val="50000"/>
+              </a:schemeClr>
+            </a:lnRef>
+            <a:fillRef idx="1">
+              <a:schemeClr val="accent1"/>
+            </a:fillRef>
+            <a:effectRef idx="0">
+              <a:schemeClr val="accent1"/>
+            </a:effectRef>
+            <a:fontRef idx="minor">
+              <a:schemeClr val="lt1"/>
+            </a:fontRef>
+          </p:style>
+          <p:txBody>
+            <a:bodyPr rtlCol="0" anchor="ctr"/>
+            <a:lstStyle/>
+            <a:p>
+              <a:pPr algn="ctr"/>
+              <a:endParaRPr kumimoji="1" lang="zh-TW" altLang="en-US" sz="1000" dirty="0">
+                <a:highlight>
+                  <a:srgbClr val="000000"/>
+                </a:highlight>
+              </a:endParaRPr>
+            </a:p>
+          </p:txBody>
+        </p:sp>
+        <p:sp>
+          <p:nvSpPr>
+            <p:cNvPr id="44" name="文字方塊 43">
+              <a:extLst>
+                <a:ext uri="{FF2B5EF4-FFF2-40B4-BE49-F238E27FC236}">
+                  <a16:creationId xmlns:a16="http://schemas.microsoft.com/office/drawing/2014/main" id="{C0710C9A-D131-2C4A-BABD-A430BF1EBFBA}"/>
+                </a:ext>
+              </a:extLst>
+            </p:cNvPr>
+            <p:cNvSpPr txBox="1"/>
+            <p:nvPr/>
+          </p:nvSpPr>
+          <p:spPr>
+            <a:xfrm>
+              <a:off x="2205984" y="1189281"/>
+              <a:ext cx="1673856" cy="246221"/>
+            </a:xfrm>
+            <a:prstGeom prst="rect">
+              <a:avLst/>
+            </a:prstGeom>
+            <a:noFill/>
+          </p:spPr>
+          <p:txBody>
+            <a:bodyPr wrap="none" rtlCol="0">
+              <a:spAutoFit/>
+            </a:bodyPr>
+            <a:lstStyle/>
+            <a:p>
+              <a:r>
+                <a:rPr kumimoji="1" lang="en-US" altLang="zh-TW" sz="1000" dirty="0"/>
+                <a:t>b. Room doesn’t have object</a:t>
+              </a:r>
+              <a:endParaRPr kumimoji="1" lang="zh-TW" altLang="en-US" sz="1000" dirty="0"/>
+            </a:p>
+          </p:txBody>
+        </p:sp>
+        <p:sp>
+          <p:nvSpPr>
+            <p:cNvPr id="45" name="文字方塊 44">
+              <a:extLst>
+                <a:ext uri="{FF2B5EF4-FFF2-40B4-BE49-F238E27FC236}">
+                  <a16:creationId xmlns:a16="http://schemas.microsoft.com/office/drawing/2014/main" id="{A2A6236F-5D20-0C41-A04F-CA8D71C36B03}"/>
+                </a:ext>
+              </a:extLst>
+            </p:cNvPr>
+            <p:cNvSpPr txBox="1"/>
+            <p:nvPr/>
+          </p:nvSpPr>
+          <p:spPr>
+            <a:xfrm>
+              <a:off x="2296495" y="889082"/>
+              <a:ext cx="1039067" cy="246221"/>
+            </a:xfrm>
+            <a:prstGeom prst="rect">
+              <a:avLst/>
+            </a:prstGeom>
+            <a:noFill/>
+            <a:ln>
+              <a:solidFill>
+                <a:srgbClr val="0432FF"/>
+              </a:solidFill>
+            </a:ln>
+          </p:spPr>
+          <p:txBody>
+            <a:bodyPr wrap="none" rtlCol="0">
+              <a:spAutoFit/>
+            </a:bodyPr>
+            <a:lstStyle/>
+            <a:p>
+              <a:r>
+                <a:rPr kumimoji="1" lang="en-US" altLang="zh-TW" sz="1000" dirty="0">
+                  <a:solidFill>
+                    <a:srgbClr val="0432FF"/>
+                  </a:solidFill>
+                </a:rPr>
+                <a:t>createMonster()</a:t>
+              </a:r>
+              <a:endParaRPr kumimoji="1" lang="zh-TW" altLang="en-US" sz="1000" dirty="0">
+                <a:solidFill>
+                  <a:srgbClr val="0432FF"/>
+                </a:solidFill>
+              </a:endParaRPr>
+            </a:p>
+          </p:txBody>
+        </p:sp>
+        <p:sp>
+          <p:nvSpPr>
+            <p:cNvPr id="46" name="文字方塊 45">
+              <a:extLst>
+                <a:ext uri="{FF2B5EF4-FFF2-40B4-BE49-F238E27FC236}">
+                  <a16:creationId xmlns:a16="http://schemas.microsoft.com/office/drawing/2014/main" id="{ABB09BDD-B9C8-F44F-865C-2C3E09E0758C}"/>
+                </a:ext>
+              </a:extLst>
+            </p:cNvPr>
+            <p:cNvSpPr txBox="1"/>
+            <p:nvPr/>
+          </p:nvSpPr>
+          <p:spPr>
+            <a:xfrm>
+              <a:off x="2296495" y="580045"/>
+              <a:ext cx="1039067" cy="246221"/>
+            </a:xfrm>
+            <a:prstGeom prst="rect">
+              <a:avLst/>
+            </a:prstGeom>
+            <a:noFill/>
+            <a:ln>
+              <a:solidFill>
+                <a:srgbClr val="0432FF"/>
+              </a:solidFill>
+            </a:ln>
+          </p:spPr>
+          <p:txBody>
+            <a:bodyPr wrap="square" rtlCol="0">
+              <a:spAutoFit/>
+            </a:bodyPr>
+            <a:lstStyle/>
+            <a:p>
+              <a:r>
+                <a:rPr kumimoji="1" lang="en-US" altLang="zh-TW" sz="1000" dirty="0">
+                  <a:solidFill>
+                    <a:srgbClr val="0432FF"/>
+                  </a:solidFill>
+                </a:rPr>
+                <a:t>createChest()</a:t>
+              </a:r>
+              <a:endParaRPr kumimoji="1" lang="zh-TW" altLang="en-US" sz="1000" dirty="0">
+                <a:solidFill>
+                  <a:srgbClr val="0432FF"/>
+                </a:solidFill>
+              </a:endParaRPr>
+            </a:p>
+          </p:txBody>
+        </p:sp>
+        <p:sp>
+          <p:nvSpPr>
+            <p:cNvPr id="48" name="文字方塊 47">
+              <a:extLst>
+                <a:ext uri="{FF2B5EF4-FFF2-40B4-BE49-F238E27FC236}">
+                  <a16:creationId xmlns:a16="http://schemas.microsoft.com/office/drawing/2014/main" id="{5373D2D4-1BC5-8749-AA0A-5416223F6E26}"/>
+                </a:ext>
+              </a:extLst>
+            </p:cNvPr>
+            <p:cNvSpPr txBox="1"/>
+            <p:nvPr/>
+          </p:nvSpPr>
+          <p:spPr>
+            <a:xfrm>
+              <a:off x="2145751" y="1663444"/>
+              <a:ext cx="1940876" cy="246221"/>
+            </a:xfrm>
+            <a:prstGeom prst="rect">
+              <a:avLst/>
+            </a:prstGeom>
+            <a:noFill/>
+            <a:ln>
+              <a:solidFill>
+                <a:srgbClr val="0432FF"/>
+              </a:solidFill>
+            </a:ln>
+          </p:spPr>
+          <p:txBody>
+            <a:bodyPr wrap="square" rtlCol="0">
+              <a:spAutoFit/>
+            </a:bodyPr>
+            <a:lstStyle/>
+            <a:p>
+              <a:pPr algn="ctr"/>
+              <a:r>
+                <a:rPr kumimoji="1" lang="en-US" altLang="zh-TW" sz="1000" dirty="0">
+                  <a:solidFill>
+                    <a:srgbClr val="0432FF"/>
+                  </a:solidFill>
+                </a:rPr>
+                <a:t>showMap()</a:t>
+              </a:r>
+              <a:endParaRPr kumimoji="1" lang="zh-TW" altLang="en-US" sz="1000" dirty="0">
+                <a:solidFill>
+                  <a:srgbClr val="0432FF"/>
+                </a:solidFill>
+              </a:endParaRPr>
+            </a:p>
+          </p:txBody>
+        </p:sp>
+        <p:sp>
+          <p:nvSpPr>
+            <p:cNvPr id="49" name="矩形 48">
+              <a:extLst>
+                <a:ext uri="{FF2B5EF4-FFF2-40B4-BE49-F238E27FC236}">
+                  <a16:creationId xmlns:a16="http://schemas.microsoft.com/office/drawing/2014/main" id="{FB5BD1C1-A11E-874A-9B2B-A385C65EE0E9}"/>
+                </a:ext>
+              </a:extLst>
+            </p:cNvPr>
+            <p:cNvSpPr/>
+            <p:nvPr/>
+          </p:nvSpPr>
+          <p:spPr>
+            <a:xfrm>
+              <a:off x="2145751" y="2151534"/>
+              <a:ext cx="1940876" cy="814018"/>
+            </a:xfrm>
+            <a:prstGeom prst="rect">
+              <a:avLst/>
+            </a:prstGeom>
+            <a:noFill/>
+            <a:ln w="9525">
+              <a:solidFill>
+                <a:schemeClr val="tx1"/>
+              </a:solidFill>
+              <a:prstDash val="dash"/>
+            </a:ln>
+          </p:spPr>
+          <p:style>
+            <a:lnRef idx="2">
+              <a:schemeClr val="accent1">
+                <a:shade val="50000"/>
+              </a:schemeClr>
+            </a:lnRef>
+            <a:fillRef idx="1">
+              <a:schemeClr val="accent1"/>
+            </a:fillRef>
+            <a:effectRef idx="0">
+              <a:schemeClr val="accent1"/>
+            </a:effectRef>
+            <a:fontRef idx="minor">
+              <a:schemeClr val="lt1"/>
+            </a:fontRef>
+          </p:style>
+          <p:txBody>
+            <a:bodyPr rtlCol="0" anchor="ctr"/>
+            <a:lstStyle/>
+            <a:p>
+              <a:pPr algn="ctr"/>
+              <a:endParaRPr kumimoji="1" lang="zh-TW" altLang="en-US" sz="1000" dirty="0">
+                <a:highlight>
+                  <a:srgbClr val="000000"/>
+                </a:highlight>
+              </a:endParaRPr>
+            </a:p>
+          </p:txBody>
+        </p:sp>
+        <p:sp>
+          <p:nvSpPr>
+            <p:cNvPr id="51" name="矩形 50">
+              <a:extLst>
+                <a:ext uri="{FF2B5EF4-FFF2-40B4-BE49-F238E27FC236}">
+                  <a16:creationId xmlns:a16="http://schemas.microsoft.com/office/drawing/2014/main" id="{7932A07F-B49A-9E48-B85D-D6319D088DCD}"/>
+                </a:ext>
+              </a:extLst>
+            </p:cNvPr>
+            <p:cNvSpPr/>
+            <p:nvPr/>
+          </p:nvSpPr>
+          <p:spPr>
+            <a:xfrm>
+              <a:off x="2203554" y="2196047"/>
+              <a:ext cx="1798071" cy="307527"/>
+            </a:xfrm>
+            <a:prstGeom prst="rect">
+              <a:avLst/>
+            </a:prstGeom>
+            <a:noFill/>
+            <a:ln w="9525">
+              <a:solidFill>
+                <a:schemeClr val="tx1"/>
+              </a:solidFill>
+            </a:ln>
+          </p:spPr>
+          <p:style>
+            <a:lnRef idx="2">
+              <a:schemeClr val="accent1">
+                <a:shade val="50000"/>
+              </a:schemeClr>
+            </a:lnRef>
+            <a:fillRef idx="1">
+              <a:schemeClr val="accent1"/>
+            </a:fillRef>
+            <a:effectRef idx="0">
+              <a:schemeClr val="accent1"/>
+            </a:effectRef>
+            <a:fontRef idx="minor">
+              <a:schemeClr val="lt1"/>
+            </a:fontRef>
+          </p:style>
+          <p:txBody>
+            <a:bodyPr rtlCol="0" anchor="ctr"/>
+            <a:lstStyle/>
+            <a:p>
+              <a:pPr algn="ctr"/>
+              <a:endParaRPr kumimoji="1" lang="zh-TW" altLang="en-US" sz="1000" dirty="0">
+                <a:highlight>
+                  <a:srgbClr val="000000"/>
+                </a:highlight>
+              </a:endParaRPr>
+            </a:p>
+          </p:txBody>
+        </p:sp>
+        <p:cxnSp>
+          <p:nvCxnSpPr>
+            <p:cNvPr id="53" name="直線箭頭接點 52">
+              <a:extLst>
+                <a:ext uri="{FF2B5EF4-FFF2-40B4-BE49-F238E27FC236}">
+                  <a16:creationId xmlns:a16="http://schemas.microsoft.com/office/drawing/2014/main" id="{2625763F-3E0D-7C40-985A-E520C94D77CA}"/>
+                </a:ext>
+              </a:extLst>
+            </p:cNvPr>
+            <p:cNvCxnSpPr>
+              <a:cxnSpLocks/>
+              <a:endCxn id="48" idx="0"/>
+            </p:cNvCxnSpPr>
+            <p:nvPr/>
+          </p:nvCxnSpPr>
+          <p:spPr>
+            <a:xfrm>
+              <a:off x="3116189" y="1445558"/>
+              <a:ext cx="0" cy="217886"/>
+            </a:xfrm>
+            <a:prstGeom prst="straightConnector1">
+              <a:avLst/>
+            </a:prstGeom>
+            <a:ln w="12700">
+              <a:solidFill>
+                <a:schemeClr val="tx1"/>
+              </a:solidFill>
+              <a:tailEnd type="triangle"/>
+            </a:ln>
+          </p:spPr>
+          <p:style>
+            <a:lnRef idx="1">
+              <a:schemeClr val="accent1"/>
+            </a:lnRef>
+            <a:fillRef idx="0">
+              <a:schemeClr val="accent1"/>
+            </a:fillRef>
+            <a:effectRef idx="0">
+              <a:schemeClr val="accent1"/>
+            </a:effectRef>
+            <a:fontRef idx="minor">
+              <a:schemeClr val="tx1"/>
+            </a:fontRef>
+          </p:style>
+        </p:cxnSp>
+        <p:cxnSp>
+          <p:nvCxnSpPr>
+            <p:cNvPr id="55" name="直線箭頭接點 54">
+              <a:extLst>
+                <a:ext uri="{FF2B5EF4-FFF2-40B4-BE49-F238E27FC236}">
+                  <a16:creationId xmlns:a16="http://schemas.microsoft.com/office/drawing/2014/main" id="{2027D583-C346-CC4D-9AB7-524E5F03628D}"/>
+                </a:ext>
+              </a:extLst>
+            </p:cNvPr>
+            <p:cNvCxnSpPr>
+              <a:cxnSpLocks/>
+              <a:endCxn id="49" idx="0"/>
+            </p:cNvCxnSpPr>
+            <p:nvPr/>
+          </p:nvCxnSpPr>
+          <p:spPr>
+            <a:xfrm>
+              <a:off x="3116189" y="1909665"/>
+              <a:ext cx="0" cy="241869"/>
+            </a:xfrm>
+            <a:prstGeom prst="straightConnector1">
+              <a:avLst/>
+            </a:prstGeom>
+            <a:ln w="12700">
+              <a:solidFill>
+                <a:schemeClr val="tx1"/>
+              </a:solidFill>
+              <a:tailEnd type="triangle"/>
+            </a:ln>
+          </p:spPr>
+          <p:style>
+            <a:lnRef idx="1">
+              <a:schemeClr val="accent1"/>
+            </a:lnRef>
+            <a:fillRef idx="0">
+              <a:schemeClr val="accent1"/>
+            </a:fillRef>
+            <a:effectRef idx="0">
+              <a:schemeClr val="accent1"/>
+            </a:effectRef>
+            <a:fontRef idx="minor">
+              <a:schemeClr val="tx1"/>
+            </a:fontRef>
+          </p:style>
+        </p:cxnSp>
+        <p:sp>
+          <p:nvSpPr>
+            <p:cNvPr id="50" name="文字方塊 49">
+              <a:extLst>
+                <a:ext uri="{FF2B5EF4-FFF2-40B4-BE49-F238E27FC236}">
+                  <a16:creationId xmlns:a16="http://schemas.microsoft.com/office/drawing/2014/main" id="{8FCE9FB1-DA55-D44E-A49A-6D92559B858B}"/>
+                </a:ext>
+              </a:extLst>
+            </p:cNvPr>
+            <p:cNvSpPr txBox="1"/>
+            <p:nvPr/>
+          </p:nvSpPr>
+          <p:spPr>
+            <a:xfrm>
+              <a:off x="2175504" y="2226700"/>
+              <a:ext cx="667170" cy="246221"/>
+            </a:xfrm>
+            <a:prstGeom prst="rect">
+              <a:avLst/>
+            </a:prstGeom>
+            <a:noFill/>
+          </p:spPr>
+          <p:txBody>
+            <a:bodyPr wrap="none" rtlCol="0">
+              <a:spAutoFit/>
+            </a:bodyPr>
+            <a:lstStyle/>
+            <a:p>
+              <a:r>
+                <a:rPr kumimoji="1" lang="en-US" altLang="zh-TW" sz="1000" dirty="0"/>
+                <a:t>a. Move: </a:t>
+              </a:r>
+              <a:endParaRPr kumimoji="1" lang="zh-TW" altLang="en-US" sz="1000" dirty="0"/>
+            </a:p>
+          </p:txBody>
+        </p:sp>
+        <p:sp>
+          <p:nvSpPr>
+            <p:cNvPr id="56" name="文字方塊 55">
+              <a:extLst>
+                <a:ext uri="{FF2B5EF4-FFF2-40B4-BE49-F238E27FC236}">
+                  <a16:creationId xmlns:a16="http://schemas.microsoft.com/office/drawing/2014/main" id="{B9E8D6E6-9933-F944-BBA7-B6B3E5DD1CB1}"/>
+                </a:ext>
+              </a:extLst>
+            </p:cNvPr>
+            <p:cNvSpPr txBox="1"/>
+            <p:nvPr/>
+          </p:nvSpPr>
+          <p:spPr>
+            <a:xfrm>
+              <a:off x="2770957" y="2226700"/>
+              <a:ext cx="1183411" cy="246221"/>
+            </a:xfrm>
+            <a:prstGeom prst="rect">
+              <a:avLst/>
+            </a:prstGeom>
+            <a:noFill/>
+            <a:ln>
+              <a:solidFill>
+                <a:srgbClr val="0432FF"/>
+              </a:solidFill>
+            </a:ln>
+          </p:spPr>
+          <p:txBody>
+            <a:bodyPr wrap="none" rtlCol="0">
+              <a:spAutoFit/>
+            </a:bodyPr>
+            <a:lstStyle/>
+            <a:p>
+              <a:r>
+                <a:rPr kumimoji="1" lang="en-US" altLang="zh-TW" sz="1000" dirty="0">
+                  <a:solidFill>
+                    <a:srgbClr val="0432FF"/>
+                  </a:solidFill>
+                </a:rPr>
+                <a:t>handleMovement()</a:t>
+              </a:r>
+              <a:endParaRPr kumimoji="1" lang="zh-TW" altLang="en-US" sz="1000" dirty="0">
+                <a:solidFill>
+                  <a:srgbClr val="0432FF"/>
+                </a:solidFill>
+              </a:endParaRPr>
+            </a:p>
+          </p:txBody>
+        </p:sp>
+        <p:sp>
+          <p:nvSpPr>
+            <p:cNvPr id="58" name="文字方塊 57">
+              <a:extLst>
+                <a:ext uri="{FF2B5EF4-FFF2-40B4-BE49-F238E27FC236}">
+                  <a16:creationId xmlns:a16="http://schemas.microsoft.com/office/drawing/2014/main" id="{8763BCEB-1680-C644-BEDA-F198F50A7BAE}"/>
+                </a:ext>
+              </a:extLst>
+            </p:cNvPr>
+            <p:cNvSpPr txBox="1"/>
+            <p:nvPr/>
+          </p:nvSpPr>
+          <p:spPr>
+            <a:xfrm>
+              <a:off x="2175504" y="2534962"/>
+              <a:ext cx="1927131" cy="400110"/>
+            </a:xfrm>
+            <a:prstGeom prst="rect">
+              <a:avLst/>
+            </a:prstGeom>
+            <a:noFill/>
+          </p:spPr>
+          <p:txBody>
+            <a:bodyPr wrap="none" rtlCol="0">
+              <a:spAutoFit/>
+            </a:bodyPr>
+            <a:lstStyle/>
+            <a:p>
+              <a:r>
+                <a:rPr kumimoji="1" lang="en-US" altLang="zh-TW" sz="1000" dirty="0"/>
+                <a:t>b. Check status, c. Use backpack,</a:t>
+              </a:r>
+              <a:br>
+                <a:rPr kumimoji="1" lang="en-US" altLang="zh-TW" sz="1000" dirty="0"/>
+              </a:br>
+              <a:r>
+                <a:rPr kumimoji="1" lang="en-US" altLang="zh-TW" sz="1000" dirty="0"/>
+                <a:t>d. Game options: Save, Load, Quit</a:t>
+              </a:r>
+              <a:endParaRPr kumimoji="1" lang="zh-TW" altLang="en-US" sz="1000" dirty="0"/>
+            </a:p>
+          </p:txBody>
+        </p:sp>
+      </p:grpSp>
+      <p:grpSp>
+        <p:nvGrpSpPr>
+          <p:cNvPr id="64" name="群組 63">
+            <a:extLst>
+              <a:ext uri="{FF2B5EF4-FFF2-40B4-BE49-F238E27FC236}">
+                <a16:creationId xmlns:a16="http://schemas.microsoft.com/office/drawing/2014/main" id="{1EEF7AC4-3F19-5448-83A8-58B00D80EB8B}"/>
+              </a:ext>
+            </a:extLst>
+          </p:cNvPr>
+          <p:cNvGrpSpPr/>
+          <p:nvPr/>
+        </p:nvGrpSpPr>
+        <p:grpSpPr>
+          <a:xfrm>
+            <a:off x="5221039" y="641392"/>
+            <a:ext cx="1421656" cy="2079292"/>
+            <a:chOff x="5346445" y="70750"/>
+            <a:chExt cx="1421656" cy="2079292"/>
+          </a:xfrm>
+        </p:grpSpPr>
+        <p:sp>
+          <p:nvSpPr>
+            <p:cNvPr id="60" name="文字方塊 59">
+              <a:extLst>
+                <a:ext uri="{FF2B5EF4-FFF2-40B4-BE49-F238E27FC236}">
+                  <a16:creationId xmlns:a16="http://schemas.microsoft.com/office/drawing/2014/main" id="{3213025F-FCC6-604B-BA2F-989079EEAF02}"/>
+                </a:ext>
+              </a:extLst>
+            </p:cNvPr>
+            <p:cNvSpPr txBox="1"/>
+            <p:nvPr/>
+          </p:nvSpPr>
+          <p:spPr>
+            <a:xfrm>
+              <a:off x="5346446" y="76613"/>
+              <a:ext cx="1133644" cy="246221"/>
+            </a:xfrm>
+            <a:prstGeom prst="rect">
+              <a:avLst/>
+            </a:prstGeom>
+            <a:noFill/>
+          </p:spPr>
+          <p:txBody>
+            <a:bodyPr wrap="none" rtlCol="0">
+              <a:spAutoFit/>
+            </a:bodyPr>
+            <a:lstStyle/>
+            <a:p>
+              <a:r>
+                <a:rPr kumimoji="1" lang="en-US" altLang="zh-TW" sz="1000" dirty="0">
+                  <a:solidFill>
+                    <a:srgbClr val="0432FF"/>
+                  </a:solidFill>
+                </a:rPr>
+                <a:t>checkGameLogic()</a:t>
+              </a:r>
+              <a:endParaRPr kumimoji="1" lang="zh-TW" altLang="en-US" sz="1000" dirty="0">
+                <a:solidFill>
+                  <a:srgbClr val="0432FF"/>
+                </a:solidFill>
+              </a:endParaRPr>
+            </a:p>
+          </p:txBody>
+        </p:sp>
+        <p:sp>
+          <p:nvSpPr>
+            <p:cNvPr id="61" name="矩形 60">
+              <a:extLst>
+                <a:ext uri="{FF2B5EF4-FFF2-40B4-BE49-F238E27FC236}">
+                  <a16:creationId xmlns:a16="http://schemas.microsoft.com/office/drawing/2014/main" id="{15AEDB9F-AEC2-354C-85E1-E8F5B52C92FB}"/>
+                </a:ext>
+              </a:extLst>
+            </p:cNvPr>
+            <p:cNvSpPr/>
+            <p:nvPr/>
+          </p:nvSpPr>
+          <p:spPr>
+            <a:xfrm>
+              <a:off x="5346445" y="70750"/>
+              <a:ext cx="1417376" cy="2079292"/>
+            </a:xfrm>
+            <a:prstGeom prst="rect">
+              <a:avLst/>
+            </a:prstGeom>
+            <a:noFill/>
+            <a:ln w="9525">
+              <a:solidFill>
+                <a:srgbClr val="0432FF"/>
+              </a:solidFill>
+            </a:ln>
+          </p:spPr>
+          <p:style>
+            <a:lnRef idx="2">
+              <a:schemeClr val="accent1">
+                <a:shade val="50000"/>
+              </a:schemeClr>
+            </a:lnRef>
+            <a:fillRef idx="1">
+              <a:schemeClr val="accent1"/>
+            </a:fillRef>
+            <a:effectRef idx="0">
+              <a:schemeClr val="accent1"/>
+            </a:effectRef>
+            <a:fontRef idx="minor">
+              <a:schemeClr val="lt1"/>
+            </a:fontRef>
+          </p:style>
+          <p:txBody>
+            <a:bodyPr rtlCol="0" anchor="ctr"/>
+            <a:lstStyle/>
+            <a:p>
+              <a:pPr algn="ctr"/>
+              <a:endParaRPr kumimoji="1" lang="zh-TW" altLang="en-US" sz="1000"/>
+            </a:p>
+          </p:txBody>
+        </p:sp>
+        <p:sp>
+          <p:nvSpPr>
+            <p:cNvPr id="62" name="文字方塊 61">
+              <a:extLst>
+                <a:ext uri="{FF2B5EF4-FFF2-40B4-BE49-F238E27FC236}">
+                  <a16:creationId xmlns:a16="http://schemas.microsoft.com/office/drawing/2014/main" id="{F17137DB-11AB-5B46-8FBA-D41266AE5A92}"/>
+                </a:ext>
+              </a:extLst>
+            </p:cNvPr>
+            <p:cNvSpPr txBox="1"/>
+            <p:nvPr/>
+          </p:nvSpPr>
+          <p:spPr>
+            <a:xfrm>
+              <a:off x="5365153" y="364937"/>
+              <a:ext cx="1402948" cy="1785104"/>
+            </a:xfrm>
+            <a:prstGeom prst="rect">
+              <a:avLst/>
+            </a:prstGeom>
+            <a:noFill/>
+          </p:spPr>
+          <p:txBody>
+            <a:bodyPr wrap="none" rtlCol="0">
+              <a:spAutoFit/>
+            </a:bodyPr>
+            <a:lstStyle/>
+            <a:p>
+              <a:r>
+                <a:rPr kumimoji="1" lang="en-US" altLang="zh-TW" sz="1000" dirty="0"/>
+                <a:t>1. Is Player dead?</a:t>
+              </a:r>
+            </a:p>
+            <a:p>
+              <a:r>
+                <a:rPr kumimoji="1" lang="en-US" altLang="zh-TW" sz="1000" dirty="0"/>
+                <a:t>Yes: → Game End (loss)</a:t>
+              </a:r>
+            </a:p>
+            <a:p>
+              <a:r>
+                <a:rPr kumimoji="1" lang="en-US" altLang="zh-TW" sz="1000" dirty="0"/>
+                <a:t>No:  → 2.</a:t>
+              </a:r>
+            </a:p>
+            <a:p>
+              <a:endParaRPr kumimoji="1" lang="en-US" altLang="zh-TW" sz="1000" dirty="0"/>
+            </a:p>
+            <a:p>
+              <a:r>
+                <a:rPr kumimoji="1" lang="en-US" altLang="zh-TW" sz="1000" dirty="0"/>
+                <a:t>2. Is Player at goal?</a:t>
+              </a:r>
+            </a:p>
+            <a:p>
+              <a:r>
+                <a:rPr kumimoji="1" lang="en-US" altLang="zh-TW" sz="1000" dirty="0"/>
+                <a:t>Yes: → 3.</a:t>
+              </a:r>
+            </a:p>
+            <a:p>
+              <a:r>
+                <a:rPr kumimoji="1" lang="en-US" altLang="zh-TW" sz="1000" dirty="0"/>
+                <a:t>No:  → </a:t>
+              </a:r>
+              <a:r>
+                <a:rPr kumimoji="1" lang="en-US" altLang="zh-TW" sz="1000" dirty="0">
+                  <a:solidFill>
+                    <a:srgbClr val="0432FF"/>
+                  </a:solidFill>
+                </a:rPr>
+                <a:t>chooseAction()</a:t>
+              </a:r>
+            </a:p>
+            <a:p>
+              <a:endParaRPr kumimoji="1" lang="en-US" altLang="zh-TW" sz="1000" dirty="0">
+                <a:solidFill>
+                  <a:srgbClr val="0432FF"/>
+                </a:solidFill>
+              </a:endParaRPr>
+            </a:p>
+            <a:p>
+              <a:r>
+                <a:rPr kumimoji="1" lang="en-US" altLang="zh-TW" sz="1000" dirty="0"/>
+                <a:t>3. Is Boss dead?</a:t>
+              </a:r>
+            </a:p>
+            <a:p>
+              <a:r>
+                <a:rPr kumimoji="1" lang="en-US" altLang="zh-TW" sz="1000" dirty="0"/>
+                <a:t>Yes: → Game End (win)</a:t>
+              </a:r>
+            </a:p>
+            <a:p>
+              <a:r>
+                <a:rPr kumimoji="1" lang="en-US" altLang="zh-TW" sz="1000" dirty="0"/>
+                <a:t>No: → </a:t>
+              </a:r>
+              <a:r>
+                <a:rPr kumimoji="1" lang="en-US" altLang="zh-TW" sz="1000" dirty="0">
+                  <a:solidFill>
+                    <a:srgbClr val="0432FF"/>
+                  </a:solidFill>
+                </a:rPr>
+                <a:t>chooseAction()</a:t>
+              </a:r>
+              <a:endParaRPr kumimoji="1" lang="zh-TW" altLang="en-US" sz="1000" dirty="0"/>
+            </a:p>
+          </p:txBody>
+        </p:sp>
+      </p:grpSp>
+      <p:cxnSp>
+        <p:nvCxnSpPr>
+          <p:cNvPr id="66" name="直線箭頭接點 65">
+            <a:extLst>
+              <a:ext uri="{FF2B5EF4-FFF2-40B4-BE49-F238E27FC236}">
+                <a16:creationId xmlns:a16="http://schemas.microsoft.com/office/drawing/2014/main" id="{347EED6F-6529-1243-BF7F-2076B7D045D2}"/>
+              </a:ext>
+            </a:extLst>
+          </p:cNvPr>
+          <p:cNvCxnSpPr>
+            <a:cxnSpLocks/>
+          </p:cNvCxnSpPr>
+          <p:nvPr/>
+        </p:nvCxnSpPr>
+        <p:spPr>
+          <a:xfrm>
+            <a:off x="1748466" y="1798502"/>
+            <a:ext cx="483266" cy="0"/>
+          </a:xfrm>
+          <a:prstGeom prst="straightConnector1">
+            <a:avLst/>
+          </a:prstGeom>
+          <a:ln w="12700">
+            <a:solidFill>
+              <a:schemeClr val="tx1"/>
+            </a:solidFill>
+            <a:tailEnd type="triangle"/>
+          </a:ln>
+        </p:spPr>
+        <p:style>
+          <a:lnRef idx="1">
+            <a:schemeClr val="accent1"/>
+          </a:lnRef>
+          <a:fillRef idx="0">
+            <a:schemeClr val="accent1"/>
+          </a:fillRef>
+          <a:effectRef idx="0">
+            <a:schemeClr val="accent1"/>
+          </a:effectRef>
+          <a:fontRef idx="minor">
+            <a:schemeClr val="tx1"/>
+          </a:fontRef>
+        </p:style>
+      </p:cxnSp>
+      <p:sp>
+        <p:nvSpPr>
+          <p:cNvPr id="68" name="弧線 67">
+            <a:extLst>
+              <a:ext uri="{FF2B5EF4-FFF2-40B4-BE49-F238E27FC236}">
+                <a16:creationId xmlns:a16="http://schemas.microsoft.com/office/drawing/2014/main" id="{67820931-212C-184C-A8DB-196E47FC1869}"/>
+              </a:ext>
+            </a:extLst>
+          </p:cNvPr>
+          <p:cNvSpPr/>
+          <p:nvPr/>
+        </p:nvSpPr>
+        <p:spPr>
+          <a:xfrm>
+            <a:off x="4363304" y="1359962"/>
+            <a:ext cx="853456" cy="566486"/>
+          </a:xfrm>
+          <a:prstGeom prst="arc">
+            <a:avLst>
+              <a:gd name="adj1" fmla="val 11535862"/>
+              <a:gd name="adj2" fmla="val 21065584"/>
+            </a:avLst>
+          </a:prstGeom>
+          <a:ln w="12700">
+            <a:solidFill>
+              <a:schemeClr val="tx1"/>
+            </a:solidFill>
+            <a:headEnd type="none" w="med" len="med"/>
+            <a:tailEnd type="triangle" w="med" len="med"/>
+          </a:ln>
+        </p:spPr>
+        <p:style>
+          <a:lnRef idx="1">
+            <a:schemeClr val="accent1"/>
+          </a:lnRef>
+          <a:fillRef idx="0">
+            <a:schemeClr val="accent1"/>
+          </a:fillRef>
+          <a:effectRef idx="0">
+            <a:schemeClr val="accent1"/>
+          </a:effectRef>
+          <a:fontRef idx="minor">
+            <a:schemeClr val="tx1"/>
+          </a:fontRef>
+        </p:style>
+        <p:txBody>
+          <a:bodyPr rtlCol="0" anchor="ctr"/>
+          <a:lstStyle/>
+          <a:p>
+            <a:pPr algn="ctr"/>
+            <a:endParaRPr kumimoji="1" lang="zh-TW" altLang="en-US"/>
+          </a:p>
+        </p:txBody>
+      </p:sp>
+      <p:sp>
+        <p:nvSpPr>
+          <p:cNvPr id="69" name="弧線 68">
+            <a:extLst>
+              <a:ext uri="{FF2B5EF4-FFF2-40B4-BE49-F238E27FC236}">
+                <a16:creationId xmlns:a16="http://schemas.microsoft.com/office/drawing/2014/main" id="{6195797C-6D1A-9245-B7EF-0CBA4028117B}"/>
+              </a:ext>
+            </a:extLst>
+          </p:cNvPr>
+          <p:cNvSpPr/>
+          <p:nvPr/>
+        </p:nvSpPr>
+        <p:spPr>
+          <a:xfrm flipH="1" flipV="1">
+            <a:off x="4358306" y="1554332"/>
+            <a:ext cx="858451" cy="569802"/>
+          </a:xfrm>
+          <a:prstGeom prst="arc">
+            <a:avLst>
+              <a:gd name="adj1" fmla="val 11535862"/>
+              <a:gd name="adj2" fmla="val 21065584"/>
+            </a:avLst>
+          </a:prstGeom>
+          <a:ln w="12700">
+            <a:solidFill>
+              <a:schemeClr val="tx1"/>
+            </a:solidFill>
+            <a:headEnd type="none" w="med" len="med"/>
+            <a:tailEnd type="triangle" w="med" len="med"/>
+          </a:ln>
+        </p:spPr>
+        <p:style>
+          <a:lnRef idx="1">
+            <a:schemeClr val="accent1"/>
+          </a:lnRef>
+          <a:fillRef idx="0">
+            <a:schemeClr val="accent1"/>
+          </a:fillRef>
+          <a:effectRef idx="0">
+            <a:schemeClr val="accent1"/>
+          </a:effectRef>
+          <a:fontRef idx="minor">
+            <a:schemeClr val="tx1"/>
+          </a:fontRef>
+        </p:style>
+        <p:txBody>
+          <a:bodyPr rtlCol="0" anchor="ctr"/>
+          <a:lstStyle/>
+          <a:p>
+            <a:pPr algn="ctr"/>
+            <a:endParaRPr kumimoji="1" lang="zh-TW" altLang="en-US"/>
+          </a:p>
+        </p:txBody>
+      </p:sp>
+      <p:sp>
+        <p:nvSpPr>
+          <p:cNvPr id="84" name="矩形 83">
+            <a:extLst>
+              <a:ext uri="{FF2B5EF4-FFF2-40B4-BE49-F238E27FC236}">
+                <a16:creationId xmlns:a16="http://schemas.microsoft.com/office/drawing/2014/main" id="{A52B6F94-3F09-B94B-8BC7-438F8565DBFF}"/>
+              </a:ext>
+            </a:extLst>
+          </p:cNvPr>
+          <p:cNvSpPr/>
+          <p:nvPr/>
+        </p:nvSpPr>
+        <p:spPr>
+          <a:xfrm>
+            <a:off x="100161" y="100973"/>
+            <a:ext cx="6652768" cy="3176100"/>
+          </a:xfrm>
+          <a:prstGeom prst="rect">
+            <a:avLst/>
+          </a:prstGeom>
+          <a:noFill/>
+          <a:ln w="9525">
+            <a:solidFill>
+              <a:srgbClr val="0432FF"/>
+            </a:solidFill>
+          </a:ln>
+        </p:spPr>
+        <p:style>
+          <a:lnRef idx="2">
+            <a:schemeClr val="accent1">
+              <a:shade val="50000"/>
+            </a:schemeClr>
+          </a:lnRef>
+          <a:fillRef idx="1">
+            <a:schemeClr val="accent1"/>
+          </a:fillRef>
+          <a:effectRef idx="0">
+            <a:schemeClr val="accent1"/>
+          </a:effectRef>
+          <a:fontRef idx="minor">
+            <a:schemeClr val="lt1"/>
+          </a:fontRef>
+        </p:style>
+        <p:txBody>
+          <a:bodyPr rtlCol="0" anchor="ctr"/>
+          <a:lstStyle/>
+          <a:p>
+            <a:pPr algn="ctr"/>
+            <a:endParaRPr kumimoji="1" lang="zh-TW" altLang="en-US" sz="1000"/>
+          </a:p>
+        </p:txBody>
+      </p:sp>
+      <p:cxnSp>
+        <p:nvCxnSpPr>
+          <p:cNvPr id="85" name="直線箭頭接點 84">
+            <a:extLst>
+              <a:ext uri="{FF2B5EF4-FFF2-40B4-BE49-F238E27FC236}">
+                <a16:creationId xmlns:a16="http://schemas.microsoft.com/office/drawing/2014/main" id="{3E0D8E55-BF51-CB49-B985-5562F8FFAEFE}"/>
+              </a:ext>
+            </a:extLst>
+          </p:cNvPr>
+          <p:cNvCxnSpPr>
+            <a:cxnSpLocks/>
+          </p:cNvCxnSpPr>
+          <p:nvPr/>
+        </p:nvCxnSpPr>
+        <p:spPr>
+          <a:xfrm>
+            <a:off x="4184120" y="794821"/>
+            <a:ext cx="1032638" cy="0"/>
+          </a:xfrm>
+          <a:prstGeom prst="straightConnector1">
+            <a:avLst/>
+          </a:prstGeom>
+          <a:ln w="12700">
+            <a:solidFill>
+              <a:schemeClr val="tx1"/>
+            </a:solidFill>
+            <a:tailEnd type="triangle"/>
+          </a:ln>
+        </p:spPr>
+        <p:style>
+          <a:lnRef idx="1">
+            <a:schemeClr val="accent1"/>
+          </a:lnRef>
+          <a:fillRef idx="0">
+            <a:schemeClr val="accent1"/>
+          </a:fillRef>
+          <a:effectRef idx="0">
+            <a:schemeClr val="accent1"/>
+          </a:effectRef>
+          <a:fontRef idx="minor">
+            <a:schemeClr val="tx1"/>
+          </a:fontRef>
+        </p:style>
+      </p:cxnSp>
+      <p:sp>
+        <p:nvSpPr>
+          <p:cNvPr id="89" name="文字方塊 88">
+            <a:extLst>
+              <a:ext uri="{FF2B5EF4-FFF2-40B4-BE49-F238E27FC236}">
+                <a16:creationId xmlns:a16="http://schemas.microsoft.com/office/drawing/2014/main" id="{CE36E621-21C7-9B4C-B426-9FEA8E9C49D3}"/>
+              </a:ext>
+            </a:extLst>
+          </p:cNvPr>
+          <p:cNvSpPr txBox="1"/>
+          <p:nvPr/>
+        </p:nvSpPr>
+        <p:spPr>
+          <a:xfrm>
+            <a:off x="4298746" y="571320"/>
+            <a:ext cx="902811" cy="246221"/>
+          </a:xfrm>
+          <a:prstGeom prst="rect">
+            <a:avLst/>
+          </a:prstGeom>
+          <a:noFill/>
+        </p:spPr>
+        <p:txBody>
+          <a:bodyPr wrap="none" rtlCol="0">
+            <a:spAutoFit/>
+          </a:bodyPr>
+          <a:lstStyle/>
+          <a:p>
+            <a:r>
+              <a:rPr kumimoji="1" lang="en-US" altLang="zh-TW" sz="1000" dirty="0"/>
+              <a:t>Player is dead</a:t>
+            </a:r>
+            <a:endParaRPr kumimoji="1" lang="zh-TW" altLang="en-US" sz="1000" dirty="0"/>
+          </a:p>
+        </p:txBody>
+      </p:sp>
+    </p:spTree>
+    <p:extLst>
+      <p:ext uri="{BB962C8B-B14F-4D97-AF65-F5344CB8AC3E}">
+        <p14:creationId xmlns:p14="http://schemas.microsoft.com/office/powerpoint/2010/main" val="2754849165"/>
       </p:ext>
     </p:extLst>
   </p:cSld>

</xml_diff>

<commit_message>
Update NCTU CPP project 20210501
</commit_message>
<xml_diff>
--- a/C++_and_OOP/NCTU/project1/HW1_609001002/pics.pptx
+++ b/C++_and_OOP/NCTU/project1/HW1_609001002/pics.pptx
@@ -10,6 +10,7 @@
     <p:sldId id="258" r:id="rId4"/>
     <p:sldId id="260" r:id="rId5"/>
     <p:sldId id="259" r:id="rId6"/>
+    <p:sldId id="261" r:id="rId7"/>
   </p:sldIdLst>
   <p:sldSz cx="6858000" cy="9906000" type="A4"/>
   <p:notesSz cx="6858000" cy="9144000"/>
@@ -247,7 +248,7 @@
           <a:p>
             <a:fld id="{CFD73A00-8293-3E44-B8FC-1344C5A2E5D4}" type="datetimeFigureOut">
               <a:rPr kumimoji="1" lang="zh-TW" altLang="en-US" smtClean="0"/>
-              <a:t>2021/4/30</a:t>
+              <a:t>2021/5/1</a:t>
             </a:fld>
             <a:endParaRPr kumimoji="1" lang="zh-TW" altLang="en-US"/>
           </a:p>
@@ -417,7 +418,7 @@
           <a:p>
             <a:fld id="{CFD73A00-8293-3E44-B8FC-1344C5A2E5D4}" type="datetimeFigureOut">
               <a:rPr kumimoji="1" lang="zh-TW" altLang="en-US" smtClean="0"/>
-              <a:t>2021/4/30</a:t>
+              <a:t>2021/5/1</a:t>
             </a:fld>
             <a:endParaRPr kumimoji="1" lang="zh-TW" altLang="en-US"/>
           </a:p>
@@ -597,7 +598,7 @@
           <a:p>
             <a:fld id="{CFD73A00-8293-3E44-B8FC-1344C5A2E5D4}" type="datetimeFigureOut">
               <a:rPr kumimoji="1" lang="zh-TW" altLang="en-US" smtClean="0"/>
-              <a:t>2021/4/30</a:t>
+              <a:t>2021/5/1</a:t>
             </a:fld>
             <a:endParaRPr kumimoji="1" lang="zh-TW" altLang="en-US"/>
           </a:p>
@@ -767,7 +768,7 @@
           <a:p>
             <a:fld id="{CFD73A00-8293-3E44-B8FC-1344C5A2E5D4}" type="datetimeFigureOut">
               <a:rPr kumimoji="1" lang="zh-TW" altLang="en-US" smtClean="0"/>
-              <a:t>2021/4/30</a:t>
+              <a:t>2021/5/1</a:t>
             </a:fld>
             <a:endParaRPr kumimoji="1" lang="zh-TW" altLang="en-US"/>
           </a:p>
@@ -1011,7 +1012,7 @@
           <a:p>
             <a:fld id="{CFD73A00-8293-3E44-B8FC-1344C5A2E5D4}" type="datetimeFigureOut">
               <a:rPr kumimoji="1" lang="zh-TW" altLang="en-US" smtClean="0"/>
-              <a:t>2021/4/30</a:t>
+              <a:t>2021/5/1</a:t>
             </a:fld>
             <a:endParaRPr kumimoji="1" lang="zh-TW" altLang="en-US"/>
           </a:p>
@@ -1243,7 +1244,7 @@
           <a:p>
             <a:fld id="{CFD73A00-8293-3E44-B8FC-1344C5A2E5D4}" type="datetimeFigureOut">
               <a:rPr kumimoji="1" lang="zh-TW" altLang="en-US" smtClean="0"/>
-              <a:t>2021/4/30</a:t>
+              <a:t>2021/5/1</a:t>
             </a:fld>
             <a:endParaRPr kumimoji="1" lang="zh-TW" altLang="en-US"/>
           </a:p>
@@ -1610,7 +1611,7 @@
           <a:p>
             <a:fld id="{CFD73A00-8293-3E44-B8FC-1344C5A2E5D4}" type="datetimeFigureOut">
               <a:rPr kumimoji="1" lang="zh-TW" altLang="en-US" smtClean="0"/>
-              <a:t>2021/4/30</a:t>
+              <a:t>2021/5/1</a:t>
             </a:fld>
             <a:endParaRPr kumimoji="1" lang="zh-TW" altLang="en-US"/>
           </a:p>
@@ -1728,7 +1729,7 @@
           <a:p>
             <a:fld id="{CFD73A00-8293-3E44-B8FC-1344C5A2E5D4}" type="datetimeFigureOut">
               <a:rPr kumimoji="1" lang="zh-TW" altLang="en-US" smtClean="0"/>
-              <a:t>2021/4/30</a:t>
+              <a:t>2021/5/1</a:t>
             </a:fld>
             <a:endParaRPr kumimoji="1" lang="zh-TW" altLang="en-US"/>
           </a:p>
@@ -1823,7 +1824,7 @@
           <a:p>
             <a:fld id="{CFD73A00-8293-3E44-B8FC-1344C5A2E5D4}" type="datetimeFigureOut">
               <a:rPr kumimoji="1" lang="zh-TW" altLang="en-US" smtClean="0"/>
-              <a:t>2021/4/30</a:t>
+              <a:t>2021/5/1</a:t>
             </a:fld>
             <a:endParaRPr kumimoji="1" lang="zh-TW" altLang="en-US"/>
           </a:p>
@@ -2100,7 +2101,7 @@
           <a:p>
             <a:fld id="{CFD73A00-8293-3E44-B8FC-1344C5A2E5D4}" type="datetimeFigureOut">
               <a:rPr kumimoji="1" lang="zh-TW" altLang="en-US" smtClean="0"/>
-              <a:t>2021/4/30</a:t>
+              <a:t>2021/5/1</a:t>
             </a:fld>
             <a:endParaRPr kumimoji="1" lang="zh-TW" altLang="en-US"/>
           </a:p>
@@ -2357,7 +2358,7 @@
           <a:p>
             <a:fld id="{CFD73A00-8293-3E44-B8FC-1344C5A2E5D4}" type="datetimeFigureOut">
               <a:rPr kumimoji="1" lang="zh-TW" altLang="en-US" smtClean="0"/>
-              <a:t>2021/4/30</a:t>
+              <a:t>2021/5/1</a:t>
             </a:fld>
             <a:endParaRPr kumimoji="1" lang="zh-TW" altLang="en-US"/>
           </a:p>
@@ -2570,7 +2571,7 @@
           <a:p>
             <a:fld id="{CFD73A00-8293-3E44-B8FC-1344C5A2E5D4}" type="datetimeFigureOut">
               <a:rPr kumimoji="1" lang="zh-TW" altLang="en-US" smtClean="0"/>
-              <a:t>2021/4/30</a:t>
+              <a:t>2021/5/1</a:t>
             </a:fld>
             <a:endParaRPr kumimoji="1" lang="zh-TW" altLang="en-US"/>
           </a:p>
@@ -20668,7 +20669,7 @@
         <p:spPr>
           <a:xfrm>
             <a:off x="79065" y="195111"/>
-            <a:ext cx="3004368" cy="3510615"/>
+            <a:ext cx="3004368" cy="3832283"/>
           </a:xfrm>
           <a:prstGeom prst="rect">
             <a:avLst/>
@@ -21167,8 +21168,8 @@
         </p:nvSpPr>
         <p:spPr>
           <a:xfrm>
-            <a:off x="194618" y="2254663"/>
-            <a:ext cx="2607970" cy="1174144"/>
+            <a:off x="194618" y="2254662"/>
+            <a:ext cx="2607970" cy="1461657"/>
           </a:xfrm>
           <a:prstGeom prst="rect">
             <a:avLst/>
@@ -21361,7 +21362,7 @@
         </p:nvSpPr>
         <p:spPr>
           <a:xfrm>
-            <a:off x="274447" y="3092232"/>
+            <a:off x="328902" y="3092232"/>
             <a:ext cx="2145619" cy="246221"/>
           </a:xfrm>
           <a:prstGeom prst="rect">
@@ -21369,9 +21370,7 @@
           </a:prstGeom>
           <a:noFill/>
           <a:ln>
-            <a:solidFill>
-              <a:srgbClr val="0432FF"/>
-            </a:solidFill>
+            <a:noFill/>
           </a:ln>
         </p:spPr>
         <p:txBody>
@@ -21541,7 +21540,7 @@
         <p:spPr>
           <a:xfrm>
             <a:off x="3251532" y="195111"/>
-            <a:ext cx="3527403" cy="3510615"/>
+            <a:ext cx="3527403" cy="3832283"/>
           </a:xfrm>
           <a:prstGeom prst="rect">
             <a:avLst/>
@@ -22059,8 +22058,8 @@
         </p:nvSpPr>
         <p:spPr>
           <a:xfrm>
-            <a:off x="3367084" y="2254663"/>
-            <a:ext cx="3329344" cy="1174144"/>
+            <a:off x="3367084" y="2254662"/>
+            <a:ext cx="3329344" cy="1461657"/>
           </a:xfrm>
           <a:prstGeom prst="rect">
             <a:avLst/>
@@ -22189,63 +22188,6 @@
                 </a:solidFill>
               </a:rPr>
               <a:t>Monster*</a:t>
-            </a:r>
-            <a:endParaRPr kumimoji="1" lang="zh-TW" altLang="en-US" sz="1000" dirty="0">
-              <a:solidFill>
-                <a:srgbClr val="00B050"/>
-              </a:solidFill>
-            </a:endParaRPr>
-          </a:p>
-        </p:txBody>
-      </p:sp>
-      <p:sp>
-        <p:nvSpPr>
-          <p:cNvPr id="50" name="文字方塊 49">
-            <a:extLst>
-              <a:ext uri="{FF2B5EF4-FFF2-40B4-BE49-F238E27FC236}">
-                <a16:creationId xmlns:a16="http://schemas.microsoft.com/office/drawing/2014/main" id="{E3207583-EF54-D041-8A7C-8437100DDF2F}"/>
-              </a:ext>
-            </a:extLst>
-          </p:cNvPr>
-          <p:cNvSpPr txBox="1"/>
-          <p:nvPr/>
-        </p:nvSpPr>
-        <p:spPr>
-          <a:xfrm>
-            <a:off x="3446914" y="3092232"/>
-            <a:ext cx="2853852" cy="246221"/>
-          </a:xfrm>
-          <a:prstGeom prst="rect">
-            <a:avLst/>
-          </a:prstGeom>
-          <a:noFill/>
-          <a:ln>
-            <a:solidFill>
-              <a:srgbClr val="0432FF"/>
-            </a:solidFill>
-          </a:ln>
-        </p:spPr>
-        <p:txBody>
-          <a:bodyPr wrap="square" rtlCol="0">
-            <a:spAutoFit/>
-          </a:bodyPr>
-          <a:lstStyle/>
-          <a:p>
-            <a:r>
-              <a:rPr kumimoji="1" lang="en-US" altLang="zh-TW" sz="1000" dirty="0">
-                <a:solidFill>
-                  <a:srgbClr val="0432FF"/>
-                </a:solidFill>
-              </a:rPr>
-              <a:t>loadNPC(stringstream&amp;, ifstream&amp;): </a:t>
-            </a:r>
-            <a:r>
-              <a:rPr kumimoji="1" lang="en-US" altLang="zh-TW" sz="1000" dirty="0">
-                <a:solidFill>
-                  <a:srgbClr val="00B050"/>
-                </a:solidFill>
-              </a:rPr>
-              <a:t>NPC*</a:t>
             </a:r>
             <a:endParaRPr kumimoji="1" lang="zh-TW" altLang="en-US" sz="1000" dirty="0">
               <a:solidFill>
@@ -22465,7 +22407,7 @@
         </p:nvCxnSpPr>
         <p:spPr>
           <a:xfrm>
-            <a:off x="4819285" y="3428807"/>
+            <a:off x="4819285" y="3716759"/>
             <a:ext cx="0" cy="153016"/>
           </a:xfrm>
           <a:prstGeom prst="straightConnector1">
@@ -22510,7 +22452,7 @@
         </p:nvCxnSpPr>
         <p:spPr>
           <a:xfrm rot="16200000">
-            <a:off x="4923369" y="3477740"/>
+            <a:off x="4923369" y="3765692"/>
             <a:ext cx="0" cy="208167"/>
           </a:xfrm>
           <a:prstGeom prst="straightConnector1">
@@ -22552,7 +22494,7 @@
         </p:nvSpPr>
         <p:spPr>
           <a:xfrm>
-            <a:off x="5027453" y="3505315"/>
+            <a:off x="5027453" y="3793267"/>
             <a:ext cx="759043" cy="151068"/>
           </a:xfrm>
           <a:prstGeom prst="rect">
@@ -22582,6 +22524,279 @@
             <a:endParaRPr kumimoji="1" lang="zh-TW" altLang="en-US" sz="1000" dirty="0">
               <a:solidFill>
                 <a:srgbClr val="FF0000"/>
+              </a:solidFill>
+            </a:endParaRPr>
+          </a:p>
+        </p:txBody>
+      </p:sp>
+      <p:sp>
+        <p:nvSpPr>
+          <p:cNvPr id="48" name="矩形 47">
+            <a:extLst>
+              <a:ext uri="{FF2B5EF4-FFF2-40B4-BE49-F238E27FC236}">
+                <a16:creationId xmlns:a16="http://schemas.microsoft.com/office/drawing/2014/main" id="{EE56801C-62B0-EF4E-8590-592153FA6735}"/>
+              </a:ext>
+            </a:extLst>
+          </p:cNvPr>
+          <p:cNvSpPr/>
+          <p:nvPr/>
+        </p:nvSpPr>
+        <p:spPr>
+          <a:xfrm>
+            <a:off x="277264" y="3096001"/>
+            <a:ext cx="2277677" cy="538046"/>
+          </a:xfrm>
+          <a:prstGeom prst="rect">
+            <a:avLst/>
+          </a:prstGeom>
+          <a:noFill/>
+          <a:ln w="9525">
+            <a:solidFill>
+              <a:srgbClr val="0432FF"/>
+            </a:solidFill>
+          </a:ln>
+        </p:spPr>
+        <p:style>
+          <a:lnRef idx="2">
+            <a:schemeClr val="accent1">
+              <a:shade val="50000"/>
+            </a:schemeClr>
+          </a:lnRef>
+          <a:fillRef idx="1">
+            <a:schemeClr val="accent1"/>
+          </a:fillRef>
+          <a:effectRef idx="0">
+            <a:schemeClr val="accent1"/>
+          </a:effectRef>
+          <a:fontRef idx="minor">
+            <a:schemeClr val="lt1"/>
+          </a:fontRef>
+        </p:style>
+        <p:txBody>
+          <a:bodyPr rtlCol="0" anchor="ctr"/>
+          <a:lstStyle/>
+          <a:p>
+            <a:pPr algn="ctr"/>
+            <a:endParaRPr kumimoji="1" lang="zh-TW" altLang="en-US" sz="1000" dirty="0">
+              <a:highlight>
+                <a:srgbClr val="000000"/>
+              </a:highlight>
+            </a:endParaRPr>
+          </a:p>
+        </p:txBody>
+      </p:sp>
+      <p:sp>
+        <p:nvSpPr>
+          <p:cNvPr id="55" name="文字方塊 54">
+            <a:extLst>
+              <a:ext uri="{FF2B5EF4-FFF2-40B4-BE49-F238E27FC236}">
+                <a16:creationId xmlns:a16="http://schemas.microsoft.com/office/drawing/2014/main" id="{9F1D2DB9-09AA-4241-92FE-9BD1FE9CAF30}"/>
+              </a:ext>
+            </a:extLst>
+          </p:cNvPr>
+          <p:cNvSpPr txBox="1"/>
+          <p:nvPr/>
+        </p:nvSpPr>
+        <p:spPr>
+          <a:xfrm>
+            <a:off x="328902" y="3328624"/>
+            <a:ext cx="2145619" cy="246221"/>
+          </a:xfrm>
+          <a:prstGeom prst="rect">
+            <a:avLst/>
+          </a:prstGeom>
+          <a:noFill/>
+          <a:ln>
+            <a:solidFill>
+              <a:srgbClr val="0432FF"/>
+            </a:solidFill>
+          </a:ln>
+        </p:spPr>
+        <p:txBody>
+          <a:bodyPr wrap="square" rtlCol="0">
+            <a:spAutoFit/>
+          </a:bodyPr>
+          <a:lstStyle/>
+          <a:p>
+            <a:r>
+              <a:rPr kumimoji="1" lang="en-US" altLang="zh-TW" sz="1000" dirty="0">
+                <a:solidFill>
+                  <a:srgbClr val="0432FF"/>
+                </a:solidFill>
+              </a:rPr>
+              <a:t>saveItem(Item*, ofstream&amp;): void</a:t>
+            </a:r>
+            <a:endParaRPr kumimoji="1" lang="zh-TW" altLang="en-US" sz="1000" dirty="0">
+              <a:solidFill>
+                <a:srgbClr val="0432FF"/>
+              </a:solidFill>
+            </a:endParaRPr>
+          </a:p>
+        </p:txBody>
+      </p:sp>
+      <p:sp>
+        <p:nvSpPr>
+          <p:cNvPr id="56" name="文字方塊 55">
+            <a:extLst>
+              <a:ext uri="{FF2B5EF4-FFF2-40B4-BE49-F238E27FC236}">
+                <a16:creationId xmlns:a16="http://schemas.microsoft.com/office/drawing/2014/main" id="{870945E2-0BD0-CD44-9B81-92396579717E}"/>
+              </a:ext>
+            </a:extLst>
+          </p:cNvPr>
+          <p:cNvSpPr txBox="1"/>
+          <p:nvPr/>
+        </p:nvSpPr>
+        <p:spPr>
+          <a:xfrm>
+            <a:off x="3498551" y="3092232"/>
+            <a:ext cx="2394138" cy="246221"/>
+          </a:xfrm>
+          <a:prstGeom prst="rect">
+            <a:avLst/>
+          </a:prstGeom>
+          <a:noFill/>
+          <a:ln>
+            <a:noFill/>
+          </a:ln>
+        </p:spPr>
+        <p:txBody>
+          <a:bodyPr wrap="square" rtlCol="0">
+            <a:spAutoFit/>
+          </a:bodyPr>
+          <a:lstStyle/>
+          <a:p>
+            <a:r>
+              <a:rPr kumimoji="1" lang="en-US" altLang="zh-TW" sz="1000" dirty="0">
+                <a:solidFill>
+                  <a:srgbClr val="0432FF"/>
+                </a:solidFill>
+              </a:rPr>
+              <a:t>loadNPC(stringstream&amp;, ifstream&amp;): </a:t>
+            </a:r>
+            <a:r>
+              <a:rPr kumimoji="1" lang="en-US" altLang="zh-TW" sz="1000" dirty="0">
+                <a:solidFill>
+                  <a:srgbClr val="00B050"/>
+                </a:solidFill>
+              </a:rPr>
+              <a:t>NPC*</a:t>
+            </a:r>
+            <a:endParaRPr kumimoji="1" lang="zh-TW" altLang="en-US" sz="1000" dirty="0">
+              <a:solidFill>
+                <a:srgbClr val="00B050"/>
+              </a:solidFill>
+            </a:endParaRPr>
+          </a:p>
+        </p:txBody>
+      </p:sp>
+      <p:sp>
+        <p:nvSpPr>
+          <p:cNvPr id="58" name="矩形 57">
+            <a:extLst>
+              <a:ext uri="{FF2B5EF4-FFF2-40B4-BE49-F238E27FC236}">
+                <a16:creationId xmlns:a16="http://schemas.microsoft.com/office/drawing/2014/main" id="{A1749D7B-9909-2643-9A88-46112A07E559}"/>
+              </a:ext>
+            </a:extLst>
+          </p:cNvPr>
+          <p:cNvSpPr/>
+          <p:nvPr/>
+        </p:nvSpPr>
+        <p:spPr>
+          <a:xfrm>
+            <a:off x="3446912" y="3096001"/>
+            <a:ext cx="2983095" cy="538046"/>
+          </a:xfrm>
+          <a:prstGeom prst="rect">
+            <a:avLst/>
+          </a:prstGeom>
+          <a:noFill/>
+          <a:ln w="9525">
+            <a:solidFill>
+              <a:srgbClr val="0432FF"/>
+            </a:solidFill>
+          </a:ln>
+        </p:spPr>
+        <p:style>
+          <a:lnRef idx="2">
+            <a:schemeClr val="accent1">
+              <a:shade val="50000"/>
+            </a:schemeClr>
+          </a:lnRef>
+          <a:fillRef idx="1">
+            <a:schemeClr val="accent1"/>
+          </a:fillRef>
+          <a:effectRef idx="0">
+            <a:schemeClr val="accent1"/>
+          </a:effectRef>
+          <a:fontRef idx="minor">
+            <a:schemeClr val="lt1"/>
+          </a:fontRef>
+        </p:style>
+        <p:txBody>
+          <a:bodyPr rtlCol="0" anchor="ctr"/>
+          <a:lstStyle/>
+          <a:p>
+            <a:pPr algn="ctr"/>
+            <a:endParaRPr kumimoji="1" lang="zh-TW" altLang="en-US" sz="1000" dirty="0">
+              <a:highlight>
+                <a:srgbClr val="000000"/>
+              </a:highlight>
+            </a:endParaRPr>
+          </a:p>
+        </p:txBody>
+      </p:sp>
+      <p:sp>
+        <p:nvSpPr>
+          <p:cNvPr id="62" name="文字方塊 61">
+            <a:extLst>
+              <a:ext uri="{FF2B5EF4-FFF2-40B4-BE49-F238E27FC236}">
+                <a16:creationId xmlns:a16="http://schemas.microsoft.com/office/drawing/2014/main" id="{A25DED34-1796-274B-9A33-987FDFA5E27A}"/>
+              </a:ext>
+            </a:extLst>
+          </p:cNvPr>
+          <p:cNvSpPr txBox="1"/>
+          <p:nvPr/>
+        </p:nvSpPr>
+        <p:spPr>
+          <a:xfrm>
+            <a:off x="3498551" y="3327762"/>
+            <a:ext cx="2853854" cy="246221"/>
+          </a:xfrm>
+          <a:prstGeom prst="rect">
+            <a:avLst/>
+          </a:prstGeom>
+          <a:noFill/>
+          <a:ln>
+            <a:solidFill>
+              <a:srgbClr val="0432FF"/>
+            </a:solidFill>
+          </a:ln>
+        </p:spPr>
+        <p:txBody>
+          <a:bodyPr wrap="square" rtlCol="0">
+            <a:spAutoFit/>
+          </a:bodyPr>
+          <a:lstStyle/>
+          <a:p>
+            <a:r>
+              <a:rPr kumimoji="1" lang="en-US" altLang="zh-TW" sz="1000" dirty="0">
+                <a:solidFill>
+                  <a:srgbClr val="0432FF"/>
+                </a:solidFill>
+              </a:rPr>
+              <a:t>loadItem(stringstream&amp;, ifstream&amp;): </a:t>
+            </a:r>
+            <a:r>
+              <a:rPr kumimoji="1" lang="en-US" altLang="zh-TW" sz="1000" dirty="0">
+                <a:solidFill>
+                  <a:srgbClr val="00B050"/>
+                </a:solidFill>
+              </a:rPr>
+              <a:t>Item*</a:t>
+            </a:r>
+            <a:endParaRPr kumimoji="1" lang="zh-TW" altLang="en-US" sz="1000" dirty="0">
+              <a:solidFill>
+                <a:srgbClr val="00B050"/>
               </a:solidFill>
             </a:endParaRPr>
           </a:p>
@@ -26207,6 +26422,218 @@
 </p:sld>
 </file>
 
+<file path=ppt/slides/slide6.xml><?xml version="1.0" encoding="utf-8"?>
+<p:sld xmlns:a="http://schemas.openxmlformats.org/drawingml/2006/main" xmlns:r="http://schemas.openxmlformats.org/officeDocument/2006/relationships" xmlns:p="http://schemas.openxmlformats.org/presentationml/2006/main">
+  <p:cSld>
+    <p:spTree>
+      <p:nvGrpSpPr>
+        <p:cNvPr id="1" name=""/>
+        <p:cNvGrpSpPr/>
+        <p:nvPr/>
+      </p:nvGrpSpPr>
+      <p:grpSpPr>
+        <a:xfrm>
+          <a:off x="0" y="0"/>
+          <a:ext cx="0" cy="0"/>
+          <a:chOff x="0" y="0"/>
+          <a:chExt cx="0" cy="0"/>
+        </a:xfrm>
+      </p:grpSpPr>
+      <p:pic>
+        <p:nvPicPr>
+          <p:cNvPr id="2" name="圖片 1">
+            <a:extLst>
+              <a:ext uri="{FF2B5EF4-FFF2-40B4-BE49-F238E27FC236}">
+                <a16:creationId xmlns:a16="http://schemas.microsoft.com/office/drawing/2014/main" id="{7236D494-2A6C-6D4E-96E0-6BA64CFB0440}"/>
+              </a:ext>
+            </a:extLst>
+          </p:cNvPr>
+          <p:cNvPicPr>
+            <a:picLocks noChangeAspect="1"/>
+          </p:cNvPicPr>
+          <p:nvPr/>
+        </p:nvPicPr>
+        <p:blipFill rotWithShape="1">
+          <a:blip r:embed="rId2"/>
+          <a:srcRect b="86014"/>
+          <a:stretch/>
+        </p:blipFill>
+        <p:spPr>
+          <a:xfrm>
+            <a:off x="905933" y="368839"/>
+            <a:ext cx="5046133" cy="943493"/>
+          </a:xfrm>
+          <a:prstGeom prst="rect">
+            <a:avLst/>
+          </a:prstGeom>
+        </p:spPr>
+      </p:pic>
+      <p:pic>
+        <p:nvPicPr>
+          <p:cNvPr id="6" name="圖片 5">
+            <a:extLst>
+              <a:ext uri="{FF2B5EF4-FFF2-40B4-BE49-F238E27FC236}">
+                <a16:creationId xmlns:a16="http://schemas.microsoft.com/office/drawing/2014/main" id="{42F040D3-C05F-5342-8724-4FDA720C5DC0}"/>
+              </a:ext>
+            </a:extLst>
+          </p:cNvPr>
+          <p:cNvPicPr>
+            <a:picLocks noChangeAspect="1"/>
+          </p:cNvPicPr>
+          <p:nvPr/>
+        </p:nvPicPr>
+        <p:blipFill rotWithShape="1">
+          <a:blip r:embed="rId2"/>
+          <a:srcRect t="61176" b="13598"/>
+          <a:stretch/>
+        </p:blipFill>
+        <p:spPr>
+          <a:xfrm>
+            <a:off x="905933" y="1625600"/>
+            <a:ext cx="5046133" cy="1701800"/>
+          </a:xfrm>
+          <a:prstGeom prst="rect">
+            <a:avLst/>
+          </a:prstGeom>
+        </p:spPr>
+      </p:pic>
+      <p:sp>
+        <p:nvSpPr>
+          <p:cNvPr id="7" name="矩形 6">
+            <a:extLst>
+              <a:ext uri="{FF2B5EF4-FFF2-40B4-BE49-F238E27FC236}">
+                <a16:creationId xmlns:a16="http://schemas.microsoft.com/office/drawing/2014/main" id="{F65714D7-632B-7140-8F77-B64B2E68C320}"/>
+              </a:ext>
+            </a:extLst>
+          </p:cNvPr>
+          <p:cNvSpPr/>
+          <p:nvPr/>
+        </p:nvSpPr>
+        <p:spPr>
+          <a:xfrm rot="5400000">
+            <a:off x="3245144" y="1383651"/>
+            <a:ext cx="264816" cy="170630"/>
+          </a:xfrm>
+          <a:prstGeom prst="rect">
+            <a:avLst/>
+          </a:prstGeom>
+          <a:noFill/>
+          <a:ln>
+            <a:noFill/>
+          </a:ln>
+        </p:spPr>
+        <p:style>
+          <a:lnRef idx="2">
+            <a:schemeClr val="accent1">
+              <a:shade val="50000"/>
+            </a:schemeClr>
+          </a:lnRef>
+          <a:fillRef idx="1">
+            <a:schemeClr val="accent1"/>
+          </a:fillRef>
+          <a:effectRef idx="0">
+            <a:schemeClr val="accent1"/>
+          </a:effectRef>
+          <a:fontRef idx="minor">
+            <a:schemeClr val="lt1"/>
+          </a:fontRef>
+        </p:style>
+        <p:txBody>
+          <a:bodyPr wrap="none" lIns="90000" rtlCol="0" anchor="b" anchorCtr="0">
+            <a:noAutofit/>
+          </a:bodyPr>
+          <a:lstStyle/>
+          <a:p>
+            <a:pPr algn="ctr"/>
+            <a:r>
+              <a:rPr kumimoji="1" lang="en-US" altLang="zh-TW" sz="1600" dirty="0">
+                <a:solidFill>
+                  <a:sysClr val="windowText" lastClr="000000"/>
+                </a:solidFill>
+              </a:rPr>
+              <a:t>…</a:t>
+            </a:r>
+            <a:endParaRPr kumimoji="1" lang="zh-TW" altLang="en-US" sz="1600" dirty="0">
+              <a:solidFill>
+                <a:sysClr val="windowText" lastClr="000000"/>
+              </a:solidFill>
+            </a:endParaRPr>
+          </a:p>
+        </p:txBody>
+      </p:sp>
+      <p:pic>
+        <p:nvPicPr>
+          <p:cNvPr id="8" name="圖片 7">
+            <a:extLst>
+              <a:ext uri="{FF2B5EF4-FFF2-40B4-BE49-F238E27FC236}">
+                <a16:creationId xmlns:a16="http://schemas.microsoft.com/office/drawing/2014/main" id="{8887A207-ECCF-B343-8B4E-7173D06E55CF}"/>
+              </a:ext>
+            </a:extLst>
+          </p:cNvPr>
+          <p:cNvPicPr>
+            <a:picLocks noChangeAspect="1"/>
+          </p:cNvPicPr>
+          <p:nvPr/>
+        </p:nvPicPr>
+        <p:blipFill>
+          <a:blip r:embed="rId3"/>
+          <a:stretch>
+            <a:fillRect/>
+          </a:stretch>
+        </p:blipFill>
+        <p:spPr>
+          <a:xfrm>
+            <a:off x="743436" y="3640668"/>
+            <a:ext cx="2313846" cy="2002367"/>
+          </a:xfrm>
+          <a:prstGeom prst="rect">
+            <a:avLst/>
+          </a:prstGeom>
+        </p:spPr>
+      </p:pic>
+      <p:pic>
+        <p:nvPicPr>
+          <p:cNvPr id="9" name="圖片 8">
+            <a:extLst>
+              <a:ext uri="{FF2B5EF4-FFF2-40B4-BE49-F238E27FC236}">
+                <a16:creationId xmlns:a16="http://schemas.microsoft.com/office/drawing/2014/main" id="{ACD1562B-9CD6-4546-99E9-C9C40D110331}"/>
+              </a:ext>
+            </a:extLst>
+          </p:cNvPr>
+          <p:cNvPicPr>
+            <a:picLocks noChangeAspect="1"/>
+          </p:cNvPicPr>
+          <p:nvPr/>
+        </p:nvPicPr>
+        <p:blipFill>
+          <a:blip r:embed="rId4"/>
+          <a:stretch>
+            <a:fillRect/>
+          </a:stretch>
+        </p:blipFill>
+        <p:spPr>
+          <a:xfrm>
+            <a:off x="3800718" y="3640668"/>
+            <a:ext cx="2313846" cy="2002367"/>
+          </a:xfrm>
+          <a:prstGeom prst="rect">
+            <a:avLst/>
+          </a:prstGeom>
+        </p:spPr>
+      </p:pic>
+    </p:spTree>
+    <p:extLst>
+      <p:ext uri="{BB962C8B-B14F-4D97-AF65-F5344CB8AC3E}">
+        <p14:creationId xmlns:p14="http://schemas.microsoft.com/office/powerpoint/2010/main" val="2954264689"/>
+      </p:ext>
+    </p:extLst>
+  </p:cSld>
+  <p:clrMapOvr>
+    <a:masterClrMapping/>
+  </p:clrMapOvr>
+</p:sld>
+</file>
+
 <file path=ppt/theme/theme1.xml><?xml version="1.0" encoding="utf-8"?>
 <a:theme xmlns:a="http://schemas.openxmlformats.org/drawingml/2006/main" name="Office 佈景主題">
   <a:themeElements>

</xml_diff>